<commit_message>
Calculations on U_cathode and writing
</commit_message>
<xml_diff>
--- a/Writing/Thesis_Figures/Coverage vs Potential.pptx
+++ b/Writing/Thesis_Figures/Coverage vs Potential.pptx
@@ -3706,7 +3706,7 @@
                     <a:latin typeface="Times New Roman" panose="02020603050405020304" pitchFamily="18" charset="0"/>
                     <a:cs typeface="Times New Roman" panose="02020603050405020304" pitchFamily="18" charset="0"/>
                   </a:rPr>
-                  <a:t>Potential U vs CHE </a:t>
+                  <a:t>Potential U vs RHE </a:t>
                 </a:r>
                 <a14:m>
                   <m:oMath xmlns:m="http://schemas.openxmlformats.org/officeDocument/2006/math">
@@ -3802,7 +3802,7 @@
             </p:nvSpPr>
             <p:spPr>
               <a:xfrm>
-                <a:off x="817621" y="1420791"/>
+                <a:off x="817621" y="1412529"/>
                 <a:ext cx="295274" cy="261610"/>
               </a:xfrm>
               <a:prstGeom prst="rect">
@@ -3853,7 +3853,7 @@
             </p:nvSpPr>
             <p:spPr>
               <a:xfrm>
-                <a:off x="817621" y="1420791"/>
+                <a:off x="817621" y="1412529"/>
                 <a:ext cx="295274" cy="261610"/>
               </a:xfrm>
               <a:prstGeom prst="rect">
@@ -3940,8 +3940,8 @@
             </p:nvSpPr>
             <p:spPr>
               <a:xfrm>
-                <a:off x="3277811" y="1404268"/>
-                <a:ext cx="402674" cy="261610"/>
+                <a:off x="3205141" y="1412529"/>
+                <a:ext cx="559769" cy="261610"/>
               </a:xfrm>
               <a:prstGeom prst="rect">
                 <a:avLst/>
@@ -3961,10 +3961,16 @@
                     </m:oMathParaPr>
                     <m:oMath xmlns:m="http://schemas.openxmlformats.org/officeDocument/2006/math">
                       <m:r>
-                        <a:rPr lang="da-DK" sz="1100" i="1">
+                        <a:rPr lang="da-DK" sz="1100" i="1" smtClean="0">
                           <a:latin typeface="Cambria Math" panose="02040503050406030204" pitchFamily="18" charset="0"/>
                         </a:rPr>
                         <m:t>1.2</m:t>
+                      </m:r>
+                      <m:r>
+                        <a:rPr lang="da-DK" sz="1100" b="0" i="1" smtClean="0">
+                          <a:latin typeface="Cambria Math" panose="02040503050406030204" pitchFamily="18" charset="0"/>
+                        </a:rPr>
+                        <m:t>27</m:t>
                       </m:r>
                     </m:oMath>
                   </m:oMathPara>
@@ -3991,8 +3997,8 @@
             </p:nvSpPr>
             <p:spPr>
               <a:xfrm>
-                <a:off x="3277811" y="1404268"/>
-                <a:ext cx="402674" cy="261610"/>
+                <a:off x="3205141" y="1412529"/>
+                <a:ext cx="559769" cy="261610"/>
               </a:xfrm>
               <a:prstGeom prst="rect">
                 <a:avLst/>
@@ -5133,7 +5139,7 @@
             <p:spPr>
               <a:xfrm>
                 <a:off x="1956286" y="143391"/>
-                <a:ext cx="660181" cy="279307"/>
+                <a:ext cx="687431" cy="279307"/>
               </a:xfrm>
               <a:prstGeom prst="rect">
                 <a:avLst/>
@@ -5155,7 +5161,7 @@
                       <m:sSubSup>
                         <m:sSubSupPr>
                           <m:ctrlPr>
-                            <a:rPr lang="da-DK" sz="1100" b="1" i="1">
+                            <a:rPr lang="da-DK" sz="1100" b="1" i="1" smtClean="0">
                               <a:latin typeface="Cambria Math" panose="02040503050406030204" pitchFamily="18" charset="0"/>
                               <a:cs typeface="Times New Roman" panose="02020603050405020304" pitchFamily="18" charset="0"/>
                             </a:rPr>
@@ -5181,11 +5187,11 @@
                         </m:sub>
                         <m:sup>
                           <m:r>
-                            <a:rPr lang="da-DK" sz="1100" b="1" i="1">
+                            <a:rPr lang="da-DK" sz="1100" b="1" i="1" smtClean="0">
                               <a:latin typeface="Cambria Math" panose="02040503050406030204" pitchFamily="18" charset="0"/>
                               <a:cs typeface="Times New Roman" panose="02020603050405020304" pitchFamily="18" charset="0"/>
                             </a:rPr>
-                            <m:t>𝑨𝒄𝒕𝒖𝒂𝒍</m:t>
+                            <m:t>𝑴𝒊𝒅𝒅𝒍𝒆</m:t>
                           </m:r>
                         </m:sup>
                       </m:sSubSup>
@@ -5218,7 +5224,7 @@
             <p:spPr>
               <a:xfrm>
                 <a:off x="1956286" y="143391"/>
-                <a:ext cx="660181" cy="279307"/>
+                <a:ext cx="687431" cy="279307"/>
               </a:xfrm>
               <a:prstGeom prst="rect">
                 <a:avLst/>
@@ -5932,6 +5938,152 @@
           </a:fontRef>
         </p:style>
       </p:cxnSp>
+      <mc:AlternateContent xmlns:mc="http://schemas.openxmlformats.org/markup-compatibility/2006">
+        <mc:Choice xmlns:a14="http://schemas.microsoft.com/office/drawing/2010/main" Requires="a14">
+          <p:sp>
+            <p:nvSpPr>
+              <p:cNvPr id="79" name="TextBox 78">
+                <a:extLst>
+                  <a:ext uri="{FF2B5EF4-FFF2-40B4-BE49-F238E27FC236}">
+                    <a16:creationId xmlns:a16="http://schemas.microsoft.com/office/drawing/2014/main" id="{597A7F0E-70A0-2EA8-F8D2-171859E57B09}"/>
+                  </a:ext>
+                </a:extLst>
+              </p:cNvPr>
+              <p:cNvSpPr txBox="1"/>
+              <p:nvPr/>
+            </p:nvSpPr>
+            <p:spPr>
+              <a:xfrm>
+                <a:off x="288708" y="1412529"/>
+                <a:ext cx="665567" cy="261610"/>
+              </a:xfrm>
+              <a:prstGeom prst="rect">
+                <a:avLst/>
+              </a:prstGeom>
+              <a:noFill/>
+            </p:spPr>
+            <p:txBody>
+              <a:bodyPr wrap="none" rtlCol="0">
+                <a:spAutoFit/>
+              </a:bodyPr>
+              <a:lstStyle/>
+              <a:p>
+                <a14:m>
+                  <m:oMathPara xmlns:m="http://schemas.openxmlformats.org/officeDocument/2006/math">
+                    <m:oMathParaPr>
+                      <m:jc m:val="centerGroup"/>
+                    </m:oMathParaPr>
+                    <m:oMath xmlns:m="http://schemas.openxmlformats.org/officeDocument/2006/math">
+                      <m:r>
+                        <a:rPr lang="da-DK" sz="1100" b="0" i="1" smtClean="0">
+                          <a:latin typeface="Cambria Math" panose="02040503050406030204" pitchFamily="18" charset="0"/>
+                        </a:rPr>
+                        <m:t>−0</m:t>
+                      </m:r>
+                      <m:r>
+                        <a:rPr lang="da-DK" sz="1100" i="1" smtClean="0">
+                          <a:latin typeface="Cambria Math" panose="02040503050406030204" pitchFamily="18" charset="0"/>
+                        </a:rPr>
+                        <m:t>.</m:t>
+                      </m:r>
+                      <m:r>
+                        <a:rPr lang="da-DK" sz="1100" b="0" i="1" smtClean="0">
+                          <a:latin typeface="Cambria Math" panose="02040503050406030204" pitchFamily="18" charset="0"/>
+                        </a:rPr>
+                        <m:t>171</m:t>
+                      </m:r>
+                    </m:oMath>
+                  </m:oMathPara>
+                </a14:m>
+                <a:endParaRPr lang="da-DK" sz="1100" dirty="0"/>
+              </a:p>
+            </p:txBody>
+          </p:sp>
+        </mc:Choice>
+        <mc:Fallback>
+          <p:sp>
+            <p:nvSpPr>
+              <p:cNvPr id="79" name="TextBox 78">
+                <a:extLst>
+                  <a:ext uri="{FF2B5EF4-FFF2-40B4-BE49-F238E27FC236}">
+                    <a16:creationId xmlns:a16="http://schemas.microsoft.com/office/drawing/2014/main" id="{597A7F0E-70A0-2EA8-F8D2-171859E57B09}"/>
+                  </a:ext>
+                </a:extLst>
+              </p:cNvPr>
+              <p:cNvSpPr txBox="1">
+                <a:spLocks noRot="1" noChangeAspect="1" noMove="1" noResize="1" noEditPoints="1" noAdjustHandles="1" noChangeArrowheads="1" noChangeShapeType="1" noTextEdit="1"/>
+              </p:cNvSpPr>
+              <p:nvPr/>
+            </p:nvSpPr>
+            <p:spPr>
+              <a:xfrm>
+                <a:off x="288708" y="1412529"/>
+                <a:ext cx="665567" cy="261610"/>
+              </a:xfrm>
+              <a:prstGeom prst="rect">
+                <a:avLst/>
+              </a:prstGeom>
+              <a:blipFill>
+                <a:blip r:embed="rId16"/>
+                <a:stretch>
+                  <a:fillRect/>
+                </a:stretch>
+              </a:blipFill>
+            </p:spPr>
+            <p:txBody>
+              <a:bodyPr/>
+              <a:lstStyle/>
+              <a:p>
+                <a:r>
+                  <a:rPr lang="da-DK">
+                    <a:noFill/>
+                  </a:rPr>
+                  <a:t> </a:t>
+                </a:r>
+              </a:p>
+            </p:txBody>
+          </p:sp>
+        </mc:Fallback>
+      </mc:AlternateContent>
+      <p:cxnSp>
+        <p:nvCxnSpPr>
+          <p:cNvPr id="80" name="Straight Connector 79">
+            <a:extLst>
+              <a:ext uri="{FF2B5EF4-FFF2-40B4-BE49-F238E27FC236}">
+                <a16:creationId xmlns:a16="http://schemas.microsoft.com/office/drawing/2014/main" id="{AA1E579B-ED7C-9D5F-68EB-B5BAF445F310}"/>
+              </a:ext>
+            </a:extLst>
+          </p:cNvPr>
+          <p:cNvCxnSpPr>
+            <a:cxnSpLocks/>
+          </p:cNvCxnSpPr>
+          <p:nvPr/>
+        </p:nvCxnSpPr>
+        <p:spPr>
+          <a:xfrm flipV="1">
+            <a:off x="965258" y="1350436"/>
+            <a:ext cx="0" cy="79200"/>
+          </a:xfrm>
+          <a:prstGeom prst="line">
+            <a:avLst/>
+          </a:prstGeom>
+          <a:ln/>
+        </p:spPr>
+        <p:style>
+          <a:lnRef idx="1">
+            <a:schemeClr val="dk1"/>
+          </a:lnRef>
+          <a:fillRef idx="0">
+            <a:schemeClr val="dk1"/>
+          </a:fillRef>
+          <a:effectRef idx="0">
+            <a:schemeClr val="dk1"/>
+          </a:effectRef>
+          <a:fontRef idx="minor">
+            <a:schemeClr val="tx1"/>
+          </a:fontRef>
+        </p:style>
+      </p:cxnSp>
     </p:spTree>
     <p:extLst>
       <p:ext uri="{BB962C8B-B14F-4D97-AF65-F5344CB8AC3E}">

</xml_diff>

<commit_message>
Made powerpoint for meeting
</commit_message>
<xml_diff>
--- a/Writing/Thesis_Figures/Coverage vs Potential.pptx
+++ b/Writing/Thesis_Figures/Coverage vs Potential.pptx
@@ -107,6 +107,11 @@
       </a:defRPr>
     </a:lvl9pPr>
   </p:defaultTextStyle>
+  <p:extLst>
+    <p:ext uri="{EFAFB233-063F-42B5-8137-9DF3F51BA10A}">
+      <p15:sldGuideLst xmlns:p15="http://schemas.microsoft.com/office/powerpoint/2012/main"/>
+    </p:ext>
+  </p:extLst>
 </p:presentation>
 </file>
 
@@ -192,7 +197,7 @@
           <a:p>
             <a:fld id="{7E4BB161-6267-C445-BC81-AB27B91176B9}" type="datetimeFigureOut">
               <a:rPr lang="da-DK" smtClean="0"/>
-              <a:t>30.08.2023</a:t>
+              <a:t>07.09.2023</a:t>
             </a:fld>
             <a:endParaRPr lang="da-DK"/>
           </a:p>
@@ -896,7 +901,7 @@
           <a:p>
             <a:fld id="{400C526F-8F77-6B40-B8A1-3042D0049435}" type="datetimeFigureOut">
               <a:rPr lang="da-DK" smtClean="0"/>
-              <a:t>30.08.2023</a:t>
+              <a:t>07.09.2023</a:t>
             </a:fld>
             <a:endParaRPr lang="da-DK"/>
           </a:p>
@@ -1066,7 +1071,7 @@
           <a:p>
             <a:fld id="{400C526F-8F77-6B40-B8A1-3042D0049435}" type="datetimeFigureOut">
               <a:rPr lang="da-DK" smtClean="0"/>
-              <a:t>30.08.2023</a:t>
+              <a:t>07.09.2023</a:t>
             </a:fld>
             <a:endParaRPr lang="da-DK"/>
           </a:p>
@@ -1246,7 +1251,7 @@
           <a:p>
             <a:fld id="{400C526F-8F77-6B40-B8A1-3042D0049435}" type="datetimeFigureOut">
               <a:rPr lang="da-DK" smtClean="0"/>
-              <a:t>30.08.2023</a:t>
+              <a:t>07.09.2023</a:t>
             </a:fld>
             <a:endParaRPr lang="da-DK"/>
           </a:p>
@@ -1416,7 +1421,7 @@
           <a:p>
             <a:fld id="{400C526F-8F77-6B40-B8A1-3042D0049435}" type="datetimeFigureOut">
               <a:rPr lang="da-DK" smtClean="0"/>
-              <a:t>30.08.2023</a:t>
+              <a:t>07.09.2023</a:t>
             </a:fld>
             <a:endParaRPr lang="da-DK"/>
           </a:p>
@@ -1662,7 +1667,7 @@
           <a:p>
             <a:fld id="{400C526F-8F77-6B40-B8A1-3042D0049435}" type="datetimeFigureOut">
               <a:rPr lang="da-DK" smtClean="0"/>
-              <a:t>30.08.2023</a:t>
+              <a:t>07.09.2023</a:t>
             </a:fld>
             <a:endParaRPr lang="da-DK"/>
           </a:p>
@@ -1894,7 +1899,7 @@
           <a:p>
             <a:fld id="{400C526F-8F77-6B40-B8A1-3042D0049435}" type="datetimeFigureOut">
               <a:rPr lang="da-DK" smtClean="0"/>
-              <a:t>30.08.2023</a:t>
+              <a:t>07.09.2023</a:t>
             </a:fld>
             <a:endParaRPr lang="da-DK"/>
           </a:p>
@@ -2261,7 +2266,7 @@
           <a:p>
             <a:fld id="{400C526F-8F77-6B40-B8A1-3042D0049435}" type="datetimeFigureOut">
               <a:rPr lang="da-DK" smtClean="0"/>
-              <a:t>30.08.2023</a:t>
+              <a:t>07.09.2023</a:t>
             </a:fld>
             <a:endParaRPr lang="da-DK"/>
           </a:p>
@@ -2379,7 +2384,7 @@
           <a:p>
             <a:fld id="{400C526F-8F77-6B40-B8A1-3042D0049435}" type="datetimeFigureOut">
               <a:rPr lang="da-DK" smtClean="0"/>
-              <a:t>30.08.2023</a:t>
+              <a:t>07.09.2023</a:t>
             </a:fld>
             <a:endParaRPr lang="da-DK"/>
           </a:p>
@@ -2474,7 +2479,7 @@
           <a:p>
             <a:fld id="{400C526F-8F77-6B40-B8A1-3042D0049435}" type="datetimeFigureOut">
               <a:rPr lang="da-DK" smtClean="0"/>
-              <a:t>30.08.2023</a:t>
+              <a:t>07.09.2023</a:t>
             </a:fld>
             <a:endParaRPr lang="da-DK"/>
           </a:p>
@@ -2751,7 +2756,7 @@
           <a:p>
             <a:fld id="{400C526F-8F77-6B40-B8A1-3042D0049435}" type="datetimeFigureOut">
               <a:rPr lang="da-DK" smtClean="0"/>
-              <a:t>30.08.2023</a:t>
+              <a:t>07.09.2023</a:t>
             </a:fld>
             <a:endParaRPr lang="da-DK"/>
           </a:p>
@@ -3008,7 +3013,7 @@
           <a:p>
             <a:fld id="{400C526F-8F77-6B40-B8A1-3042D0049435}" type="datetimeFigureOut">
               <a:rPr lang="da-DK" smtClean="0"/>
-              <a:t>30.08.2023</a:t>
+              <a:t>07.09.2023</a:t>
             </a:fld>
             <a:endParaRPr lang="da-DK"/>
           </a:p>
@@ -3221,7 +3226,7 @@
           <a:p>
             <a:fld id="{400C526F-8F77-6B40-B8A1-3042D0049435}" type="datetimeFigureOut">
               <a:rPr lang="da-DK" smtClean="0"/>
-              <a:t>30.08.2023</a:t>
+              <a:t>07.09.2023</a:t>
             </a:fld>
             <a:endParaRPr lang="da-DK"/>
           </a:p>
@@ -3671,8 +3676,8 @@
           </a:fontRef>
         </p:style>
       </p:cxnSp>
-      <mc:AlternateContent xmlns:mc="http://schemas.openxmlformats.org/markup-compatibility/2006">
-        <mc:Choice xmlns:a14="http://schemas.microsoft.com/office/drawing/2010/main" Requires="a14">
+      <mc:AlternateContent xmlns:mc="http://schemas.openxmlformats.org/markup-compatibility/2006" xmlns:a14="http://schemas.microsoft.com/office/drawing/2010/main">
+        <mc:Choice Requires="a14">
           <p:sp>
             <p:nvSpPr>
               <p:cNvPr id="9" name="TextBox 8">
@@ -3741,7 +3746,7 @@
             </p:txBody>
           </p:sp>
         </mc:Choice>
-        <mc:Fallback>
+        <mc:Fallback xmlns="">
           <p:sp>
             <p:nvSpPr>
               <p:cNvPr id="9" name="TextBox 8">
@@ -3786,8 +3791,8 @@
           </p:sp>
         </mc:Fallback>
       </mc:AlternateContent>
-      <mc:AlternateContent xmlns:mc="http://schemas.openxmlformats.org/markup-compatibility/2006">
-        <mc:Choice xmlns:a14="http://schemas.microsoft.com/office/drawing/2010/main" Requires="a14">
+      <mc:AlternateContent xmlns:mc="http://schemas.openxmlformats.org/markup-compatibility/2006" xmlns:a14="http://schemas.microsoft.com/office/drawing/2010/main">
+        <mc:Choice Requires="a14">
           <p:sp>
             <p:nvSpPr>
               <p:cNvPr id="14" name="TextBox 13">
@@ -3816,6 +3821,7 @@
               </a:bodyPr>
               <a:lstStyle/>
               <a:p>
+                <a:pPr/>
                 <a14:m>
                   <m:oMathPara xmlns:m="http://schemas.openxmlformats.org/officeDocument/2006/math">
                     <m:oMathParaPr>
@@ -3836,7 +3842,7 @@
             </p:txBody>
           </p:sp>
         </mc:Choice>
-        <mc:Fallback>
+        <mc:Fallback xmlns="">
           <p:sp>
             <p:nvSpPr>
               <p:cNvPr id="14" name="TextBox 13">
@@ -3924,8 +3930,8 @@
           </a:fontRef>
         </p:style>
       </p:cxnSp>
-      <mc:AlternateContent xmlns:mc="http://schemas.openxmlformats.org/markup-compatibility/2006">
-        <mc:Choice xmlns:a14="http://schemas.microsoft.com/office/drawing/2010/main" Requires="a14">
+      <mc:AlternateContent xmlns:mc="http://schemas.openxmlformats.org/markup-compatibility/2006" xmlns:a14="http://schemas.microsoft.com/office/drawing/2010/main">
+        <mc:Choice Requires="a14">
           <p:sp>
             <p:nvSpPr>
               <p:cNvPr id="22" name="TextBox 21">
@@ -3954,6 +3960,7 @@
               </a:bodyPr>
               <a:lstStyle/>
               <a:p>
+                <a:pPr/>
                 <a14:m>
                   <m:oMathPara xmlns:m="http://schemas.openxmlformats.org/officeDocument/2006/math">
                     <m:oMathParaPr>
@@ -3980,7 +3987,7 @@
             </p:txBody>
           </p:sp>
         </mc:Choice>
-        <mc:Fallback>
+        <mc:Fallback xmlns="">
           <p:sp>
             <p:nvSpPr>
               <p:cNvPr id="22" name="TextBox 21">
@@ -4176,7 +4183,7 @@
             <p:spPr>
               <a:xfrm>
                 <a:off x="1193528" y="293174"/>
-                <a:ext cx="658986" cy="246221"/>
+                <a:ext cx="658986" cy="259495"/>
               </a:xfrm>
               <a:prstGeom prst="rect">
                 <a:avLst/>
@@ -4189,6 +4196,7 @@
               </a:bodyPr>
               <a:lstStyle/>
               <a:p>
+                <a:pPr/>
                 <a14:m>
                   <m:oMathPara xmlns:m="http://schemas.openxmlformats.org/officeDocument/2006/math">
                     <m:oMathParaPr>
@@ -4198,7 +4206,7 @@
                       <m:sSub>
                         <m:sSubPr>
                           <m:ctrlPr>
-                            <a:rPr lang="da-DK" sz="1000" b="1" i="1">
+                            <a:rPr lang="da-DK" sz="1000" b="1" i="1" smtClean="0">
                               <a:solidFill>
                                 <a:srgbClr val="FF0000"/>
                               </a:solidFill>
@@ -4228,8 +4236,45 @@
                               <a:latin typeface="Cambria Math" panose="02040503050406030204" pitchFamily="18" charset="0"/>
                               <a:cs typeface="Times New Roman" panose="02020603050405020304" pitchFamily="18" charset="0"/>
                             </a:rPr>
-                            <m:t>𝑶𝑷</m:t>
+                            <m:t>𝑶</m:t>
                           </m:r>
+                          <m:sSub>
+                            <m:sSubPr>
+                              <m:ctrlPr>
+                                <a:rPr lang="da-DK" sz="1000" b="1" i="1" smtClean="0">
+                                  <a:solidFill>
+                                    <a:srgbClr val="FF0000"/>
+                                  </a:solidFill>
+                                  <a:latin typeface="Cambria Math" panose="02040503050406030204" pitchFamily="18" charset="0"/>
+                                  <a:cs typeface="Times New Roman" panose="02020603050405020304" pitchFamily="18" charset="0"/>
+                                </a:rPr>
+                              </m:ctrlPr>
+                            </m:sSubPr>
+                            <m:e>
+                              <m:r>
+                                <a:rPr lang="da-DK" sz="1000" b="1" i="1">
+                                  <a:solidFill>
+                                    <a:srgbClr val="FF0000"/>
+                                  </a:solidFill>
+                                  <a:latin typeface="Cambria Math" panose="02040503050406030204" pitchFamily="18" charset="0"/>
+                                  <a:cs typeface="Times New Roman" panose="02020603050405020304" pitchFamily="18" charset="0"/>
+                                </a:rPr>
+                                <m:t>𝑷</m:t>
+                              </m:r>
+                            </m:e>
+                            <m:sub>
+                              <m:r>
+                                <a:rPr lang="da-DK" sz="1000" b="1" i="1" smtClean="0">
+                                  <a:solidFill>
+                                    <a:srgbClr val="FF0000"/>
+                                  </a:solidFill>
+                                  <a:latin typeface="Cambria Math" panose="02040503050406030204" pitchFamily="18" charset="0"/>
+                                  <a:cs typeface="Times New Roman" panose="02020603050405020304" pitchFamily="18" charset="0"/>
+                                </a:rPr>
+                                <m:t>𝑻</m:t>
+                              </m:r>
+                            </m:sub>
+                          </m:sSub>
                         </m:sub>
                       </m:sSub>
                     </m:oMath>
@@ -4264,7 +4309,7 @@
             <p:spPr>
               <a:xfrm>
                 <a:off x="1193528" y="293174"/>
-                <a:ext cx="658986" cy="246221"/>
+                <a:ext cx="658986" cy="259495"/>
               </a:xfrm>
               <a:prstGeom prst="rect">
                 <a:avLst/>
@@ -4291,8 +4336,8 @@
           </p:sp>
         </mc:Fallback>
       </mc:AlternateContent>
-      <mc:AlternateContent xmlns:mc="http://schemas.openxmlformats.org/markup-compatibility/2006">
-        <mc:Choice xmlns:a14="http://schemas.microsoft.com/office/drawing/2010/main" Requires="a14">
+      <mc:AlternateContent xmlns:mc="http://schemas.openxmlformats.org/markup-compatibility/2006" xmlns:a14="http://schemas.microsoft.com/office/drawing/2010/main">
+        <mc:Choice Requires="a14">
           <p:sp>
             <p:nvSpPr>
               <p:cNvPr id="33" name="TextBox 32">
@@ -4321,6 +4366,7 @@
               </a:bodyPr>
               <a:lstStyle/>
               <a:p>
+                <a:pPr/>
                 <a14:m>
                   <m:oMathPara xmlns:m="http://schemas.openxmlformats.org/officeDocument/2006/math">
                     <m:oMathParaPr>
@@ -4378,7 +4424,7 @@
             </p:txBody>
           </p:sp>
         </mc:Choice>
-        <mc:Fallback>
+        <mc:Fallback xmlns="">
           <p:sp>
             <p:nvSpPr>
               <p:cNvPr id="33" name="TextBox 32">
@@ -4423,8 +4469,8 @@
           </p:sp>
         </mc:Fallback>
       </mc:AlternateContent>
-      <mc:AlternateContent xmlns:mc="http://schemas.openxmlformats.org/markup-compatibility/2006">
-        <mc:Choice xmlns:a14="http://schemas.microsoft.com/office/drawing/2010/main" Requires="a14">
+      <mc:AlternateContent xmlns:mc="http://schemas.openxmlformats.org/markup-compatibility/2006" xmlns:a14="http://schemas.microsoft.com/office/drawing/2010/main">
+        <mc:Choice Requires="a14">
           <p:sp>
             <p:nvSpPr>
               <p:cNvPr id="35" name="TextBox 34">
@@ -4453,6 +4499,7 @@
               </a:bodyPr>
               <a:lstStyle/>
               <a:p>
+                <a:pPr/>
                 <a14:m>
                   <m:oMathPara xmlns:m="http://schemas.openxmlformats.org/officeDocument/2006/math">
                     <m:oMathParaPr>
@@ -4501,7 +4548,7 @@
             </p:txBody>
           </p:sp>
         </mc:Choice>
-        <mc:Fallback>
+        <mc:Fallback xmlns="">
           <p:sp>
             <p:nvSpPr>
               <p:cNvPr id="35" name="TextBox 34">
@@ -4546,8 +4593,8 @@
           </p:sp>
         </mc:Fallback>
       </mc:AlternateContent>
-      <mc:AlternateContent xmlns:mc="http://schemas.openxmlformats.org/markup-compatibility/2006">
-        <mc:Choice xmlns:a14="http://schemas.microsoft.com/office/drawing/2010/main" Requires="a14">
+      <mc:AlternateContent xmlns:mc="http://schemas.openxmlformats.org/markup-compatibility/2006" xmlns:a14="http://schemas.microsoft.com/office/drawing/2010/main">
+        <mc:Choice Requires="a14">
           <p:sp>
             <p:nvSpPr>
               <p:cNvPr id="37" name="TextBox 36">
@@ -4576,6 +4623,7 @@
               </a:bodyPr>
               <a:lstStyle/>
               <a:p>
+                <a:pPr/>
                 <a14:m>
                   <m:oMathPara xmlns:m="http://schemas.openxmlformats.org/officeDocument/2006/math">
                     <m:oMathParaPr>
@@ -4639,7 +4687,7 @@
             </p:txBody>
           </p:sp>
         </mc:Choice>
-        <mc:Fallback>
+        <mc:Fallback xmlns="">
           <p:sp>
             <p:nvSpPr>
               <p:cNvPr id="37" name="TextBox 36">
@@ -4684,8 +4732,8 @@
           </p:sp>
         </mc:Fallback>
       </mc:AlternateContent>
-      <mc:AlternateContent xmlns:mc="http://schemas.openxmlformats.org/markup-compatibility/2006">
-        <mc:Choice xmlns:a14="http://schemas.microsoft.com/office/drawing/2010/main" Requires="a14">
+      <mc:AlternateContent xmlns:mc="http://schemas.openxmlformats.org/markup-compatibility/2006" xmlns:a14="http://schemas.microsoft.com/office/drawing/2010/main">
+        <mc:Choice Requires="a14">
           <p:sp>
             <p:nvSpPr>
               <p:cNvPr id="38" name="TextBox 37">
@@ -4714,6 +4762,7 @@
               </a:bodyPr>
               <a:lstStyle/>
               <a:p>
+                <a:pPr/>
                 <a14:m>
                   <m:oMathPara xmlns:m="http://schemas.openxmlformats.org/officeDocument/2006/math">
                     <m:oMathParaPr>
@@ -4768,7 +4817,7 @@
             </p:txBody>
           </p:sp>
         </mc:Choice>
-        <mc:Fallback>
+        <mc:Fallback xmlns="">
           <p:sp>
             <p:nvSpPr>
               <p:cNvPr id="38" name="TextBox 37">
@@ -4813,8 +4862,8 @@
           </p:sp>
         </mc:Fallback>
       </mc:AlternateContent>
-      <mc:AlternateContent xmlns:mc="http://schemas.openxmlformats.org/markup-compatibility/2006">
-        <mc:Choice xmlns:a14="http://schemas.microsoft.com/office/drawing/2010/main" Requires="a14">
+      <mc:AlternateContent xmlns:mc="http://schemas.openxmlformats.org/markup-compatibility/2006" xmlns:a14="http://schemas.microsoft.com/office/drawing/2010/main">
+        <mc:Choice Requires="a14">
           <p:sp>
             <p:nvSpPr>
               <p:cNvPr id="43" name="TextBox 42">
@@ -4899,7 +4948,7 @@
             </p:txBody>
           </p:sp>
         </mc:Choice>
-        <mc:Fallback>
+        <mc:Fallback xmlns="">
           <p:sp>
             <p:nvSpPr>
               <p:cNvPr id="43" name="TextBox 42">
@@ -4990,8 +5039,8 @@
           </a:fontRef>
         </p:style>
       </p:cxnSp>
-      <mc:AlternateContent xmlns:mc="http://schemas.openxmlformats.org/markup-compatibility/2006">
-        <mc:Choice xmlns:a14="http://schemas.microsoft.com/office/drawing/2010/main" Requires="a14">
+      <mc:AlternateContent xmlns:mc="http://schemas.openxmlformats.org/markup-compatibility/2006" xmlns:a14="http://schemas.microsoft.com/office/drawing/2010/main">
+        <mc:Choice Requires="a14">
           <p:sp>
             <p:nvSpPr>
               <p:cNvPr id="55" name="TextBox 54">
@@ -5077,7 +5126,7 @@
             </p:txBody>
           </p:sp>
         </mc:Choice>
-        <mc:Fallback>
+        <mc:Fallback xmlns="">
           <p:sp>
             <p:nvSpPr>
               <p:cNvPr id="55" name="TextBox 54">
@@ -5122,8 +5171,8 @@
           </p:sp>
         </mc:Fallback>
       </mc:AlternateContent>
-      <mc:AlternateContent xmlns:mc="http://schemas.openxmlformats.org/markup-compatibility/2006">
-        <mc:Choice xmlns:a14="http://schemas.microsoft.com/office/drawing/2010/main" Requires="a14">
+      <mc:AlternateContent xmlns:mc="http://schemas.openxmlformats.org/markup-compatibility/2006" xmlns:a14="http://schemas.microsoft.com/office/drawing/2010/main">
+        <mc:Choice Requires="a14">
           <p:sp>
             <p:nvSpPr>
               <p:cNvPr id="40" name="TextBox 39">
@@ -5152,6 +5201,7 @@
               </a:bodyPr>
               <a:lstStyle/>
               <a:p>
+                <a:pPr/>
                 <a14:m>
                   <m:oMathPara xmlns:m="http://schemas.openxmlformats.org/officeDocument/2006/math">
                     <m:oMathParaPr>
@@ -5206,7 +5256,7 @@
             </p:txBody>
           </p:sp>
         </mc:Choice>
-        <mc:Fallback>
+        <mc:Fallback xmlns="">
           <p:sp>
             <p:nvSpPr>
               <p:cNvPr id="40" name="TextBox 39">
@@ -5382,8 +5432,8 @@
           </a:fontRef>
         </p:style>
       </p:cxnSp>
-      <mc:AlternateContent xmlns:mc="http://schemas.openxmlformats.org/markup-compatibility/2006">
-        <mc:Choice xmlns:a14="http://schemas.microsoft.com/office/drawing/2010/main" Requires="a14">
+      <mc:AlternateContent xmlns:mc="http://schemas.openxmlformats.org/markup-compatibility/2006" xmlns:a14="http://schemas.microsoft.com/office/drawing/2010/main">
+        <mc:Choice Requires="a14">
           <p:sp>
             <p:nvSpPr>
               <p:cNvPr id="42" name="TextBox 41">
@@ -5412,6 +5462,7 @@
               </a:bodyPr>
               <a:lstStyle/>
               <a:p>
+                <a:pPr/>
                 <a14:m>
                   <m:oMathPara xmlns:m="http://schemas.openxmlformats.org/officeDocument/2006/math">
                     <m:oMathParaPr>
@@ -5466,7 +5517,7 @@
             </p:txBody>
           </p:sp>
         </mc:Choice>
-        <mc:Fallback>
+        <mc:Fallback xmlns="">
           <p:sp>
             <p:nvSpPr>
               <p:cNvPr id="42" name="TextBox 41">
@@ -5641,8 +5692,8 @@
           </a:fontRef>
         </p:style>
       </p:cxnSp>
-      <mc:AlternateContent xmlns:mc="http://schemas.openxmlformats.org/markup-compatibility/2006">
-        <mc:Choice xmlns:a14="http://schemas.microsoft.com/office/drawing/2010/main" Requires="a14">
+      <mc:AlternateContent xmlns:mc="http://schemas.openxmlformats.org/markup-compatibility/2006" xmlns:a14="http://schemas.microsoft.com/office/drawing/2010/main">
+        <mc:Choice Requires="a14">
           <p:sp>
             <p:nvSpPr>
               <p:cNvPr id="27" name="TextBox 26">
@@ -5671,6 +5722,7 @@
               </a:bodyPr>
               <a:lstStyle/>
               <a:p>
+                <a:pPr/>
                 <a14:m>
                   <m:oMathPara xmlns:m="http://schemas.openxmlformats.org/officeDocument/2006/math">
                     <m:oMathParaPr>
@@ -5808,7 +5860,7 @@
             </p:txBody>
           </p:sp>
         </mc:Choice>
-        <mc:Fallback>
+        <mc:Fallback xmlns="">
           <p:sp>
             <p:nvSpPr>
               <p:cNvPr id="27" name="TextBox 26">
@@ -5938,8 +5990,8 @@
           </a:fontRef>
         </p:style>
       </p:cxnSp>
-      <mc:AlternateContent xmlns:mc="http://schemas.openxmlformats.org/markup-compatibility/2006">
-        <mc:Choice xmlns:a14="http://schemas.microsoft.com/office/drawing/2010/main" Requires="a14">
+      <mc:AlternateContent xmlns:mc="http://schemas.openxmlformats.org/markup-compatibility/2006" xmlns:a14="http://schemas.microsoft.com/office/drawing/2010/main">
+        <mc:Choice Requires="a14">
           <p:sp>
             <p:nvSpPr>
               <p:cNvPr id="79" name="TextBox 78">
@@ -5968,6 +6020,7 @@
               </a:bodyPr>
               <a:lstStyle/>
               <a:p>
+                <a:pPr/>
                 <a14:m>
                   <m:oMathPara xmlns:m="http://schemas.openxmlformats.org/officeDocument/2006/math">
                     <m:oMathParaPr>
@@ -6000,7 +6053,7 @@
             </p:txBody>
           </p:sp>
         </mc:Choice>
-        <mc:Fallback>
+        <mc:Fallback xmlns="">
           <p:sp>
             <p:nvSpPr>
               <p:cNvPr id="79" name="TextBox 78">

</xml_diff>

<commit_message>
Fixed "Fuel Cells" section, halfway through "Formic Acid"
It took me half a day, and I got through 11 pages and I even wrote 1.5 page and fixed 2 figures. This pace seems to be satisfactory, even though I have 16 sections left for 10 days
</commit_message>
<xml_diff>
--- a/Writing/Thesis_Figures/Coverage vs Potential.pptx
+++ b/Writing/Thesis_Figures/Coverage vs Potential.pptx
@@ -197,7 +197,7 @@
           <a:p>
             <a:fld id="{7E4BB161-6267-C445-BC81-AB27B91176B9}" type="datetimeFigureOut">
               <a:rPr lang="da-DK" smtClean="0"/>
-              <a:t>07.09.2023</a:t>
+              <a:t>21.10.2023</a:t>
             </a:fld>
             <a:endParaRPr lang="da-DK"/>
           </a:p>
@@ -730,6 +730,28 @@
             <a:endParaRPr lang="da-DK" dirty="0"/>
           </a:p>
           <a:p>
+            <a:r>
+              <a:rPr lang="da-DK" dirty="0"/>
+              <a:t>H binds from: minus </a:t>
+            </a:r>
+            <a:r>
+              <a:rPr lang="da-DK" dirty="0" err="1"/>
+              <a:t>infinity</a:t>
+            </a:r>
+            <a:r>
+              <a:rPr lang="da-DK" dirty="0"/>
+              <a:t> to 0.40 V</a:t>
+            </a:r>
+          </a:p>
+          <a:p>
+            <a:r>
+              <a:rPr lang="da-DK" dirty="0"/>
+              <a:t>COOH binds from: 0 to </a:t>
+            </a:r>
+            <a:r>
+              <a:rPr lang="da-DK" dirty="0" err="1"/>
+              <a:t>infinity</a:t>
+            </a:r>
             <a:endParaRPr lang="da-DK" dirty="0"/>
           </a:p>
         </p:txBody>
@@ -901,7 +923,7 @@
           <a:p>
             <a:fld id="{400C526F-8F77-6B40-B8A1-3042D0049435}" type="datetimeFigureOut">
               <a:rPr lang="da-DK" smtClean="0"/>
-              <a:t>07.09.2023</a:t>
+              <a:t>21.10.2023</a:t>
             </a:fld>
             <a:endParaRPr lang="da-DK"/>
           </a:p>
@@ -1071,7 +1093,7 @@
           <a:p>
             <a:fld id="{400C526F-8F77-6B40-B8A1-3042D0049435}" type="datetimeFigureOut">
               <a:rPr lang="da-DK" smtClean="0"/>
-              <a:t>07.09.2023</a:t>
+              <a:t>21.10.2023</a:t>
             </a:fld>
             <a:endParaRPr lang="da-DK"/>
           </a:p>
@@ -1251,7 +1273,7 @@
           <a:p>
             <a:fld id="{400C526F-8F77-6B40-B8A1-3042D0049435}" type="datetimeFigureOut">
               <a:rPr lang="da-DK" smtClean="0"/>
-              <a:t>07.09.2023</a:t>
+              <a:t>21.10.2023</a:t>
             </a:fld>
             <a:endParaRPr lang="da-DK"/>
           </a:p>
@@ -1421,7 +1443,7 @@
           <a:p>
             <a:fld id="{400C526F-8F77-6B40-B8A1-3042D0049435}" type="datetimeFigureOut">
               <a:rPr lang="da-DK" smtClean="0"/>
-              <a:t>07.09.2023</a:t>
+              <a:t>21.10.2023</a:t>
             </a:fld>
             <a:endParaRPr lang="da-DK"/>
           </a:p>
@@ -1667,7 +1689,7 @@
           <a:p>
             <a:fld id="{400C526F-8F77-6B40-B8A1-3042D0049435}" type="datetimeFigureOut">
               <a:rPr lang="da-DK" smtClean="0"/>
-              <a:t>07.09.2023</a:t>
+              <a:t>21.10.2023</a:t>
             </a:fld>
             <a:endParaRPr lang="da-DK"/>
           </a:p>
@@ -1899,7 +1921,7 @@
           <a:p>
             <a:fld id="{400C526F-8F77-6B40-B8A1-3042D0049435}" type="datetimeFigureOut">
               <a:rPr lang="da-DK" smtClean="0"/>
-              <a:t>07.09.2023</a:t>
+              <a:t>21.10.2023</a:t>
             </a:fld>
             <a:endParaRPr lang="da-DK"/>
           </a:p>
@@ -2266,7 +2288,7 @@
           <a:p>
             <a:fld id="{400C526F-8F77-6B40-B8A1-3042D0049435}" type="datetimeFigureOut">
               <a:rPr lang="da-DK" smtClean="0"/>
-              <a:t>07.09.2023</a:t>
+              <a:t>21.10.2023</a:t>
             </a:fld>
             <a:endParaRPr lang="da-DK"/>
           </a:p>
@@ -2384,7 +2406,7 @@
           <a:p>
             <a:fld id="{400C526F-8F77-6B40-B8A1-3042D0049435}" type="datetimeFigureOut">
               <a:rPr lang="da-DK" smtClean="0"/>
-              <a:t>07.09.2023</a:t>
+              <a:t>21.10.2023</a:t>
             </a:fld>
             <a:endParaRPr lang="da-DK"/>
           </a:p>
@@ -2479,7 +2501,7 @@
           <a:p>
             <a:fld id="{400C526F-8F77-6B40-B8A1-3042D0049435}" type="datetimeFigureOut">
               <a:rPr lang="da-DK" smtClean="0"/>
-              <a:t>07.09.2023</a:t>
+              <a:t>21.10.2023</a:t>
             </a:fld>
             <a:endParaRPr lang="da-DK"/>
           </a:p>
@@ -2756,7 +2778,7 @@
           <a:p>
             <a:fld id="{400C526F-8F77-6B40-B8A1-3042D0049435}" type="datetimeFigureOut">
               <a:rPr lang="da-DK" smtClean="0"/>
-              <a:t>07.09.2023</a:t>
+              <a:t>21.10.2023</a:t>
             </a:fld>
             <a:endParaRPr lang="da-DK"/>
           </a:p>
@@ -3013,7 +3035,7 @@
           <a:p>
             <a:fld id="{400C526F-8F77-6B40-B8A1-3042D0049435}" type="datetimeFigureOut">
               <a:rPr lang="da-DK" smtClean="0"/>
-              <a:t>07.09.2023</a:t>
+              <a:t>21.10.2023</a:t>
             </a:fld>
             <a:endParaRPr lang="da-DK"/>
           </a:p>
@@ -3226,7 +3248,7 @@
           <a:p>
             <a:fld id="{400C526F-8F77-6B40-B8A1-3042D0049435}" type="datetimeFigureOut">
               <a:rPr lang="da-DK" smtClean="0"/>
-              <a:t>07.09.2023</a:t>
+              <a:t>21.10.2023</a:t>
             </a:fld>
             <a:endParaRPr lang="da-DK"/>
           </a:p>
@@ -3676,8 +3698,8 @@
           </a:fontRef>
         </p:style>
       </p:cxnSp>
-      <mc:AlternateContent xmlns:mc="http://schemas.openxmlformats.org/markup-compatibility/2006" xmlns:a14="http://schemas.microsoft.com/office/drawing/2010/main">
-        <mc:Choice Requires="a14">
+      <mc:AlternateContent xmlns:mc="http://schemas.openxmlformats.org/markup-compatibility/2006">
+        <mc:Choice xmlns:a14="http://schemas.microsoft.com/office/drawing/2010/main" Requires="a14">
           <p:sp>
             <p:nvSpPr>
               <p:cNvPr id="9" name="TextBox 8">
@@ -3692,7 +3714,7 @@
             </p:nvSpPr>
             <p:spPr>
               <a:xfrm>
-                <a:off x="1675620" y="1538615"/>
+                <a:off x="1675620" y="1570365"/>
                 <a:ext cx="1531188" cy="261610"/>
               </a:xfrm>
               <a:prstGeom prst="rect">
@@ -3746,7 +3768,7 @@
             </p:txBody>
           </p:sp>
         </mc:Choice>
-        <mc:Fallback xmlns="">
+        <mc:Fallback>
           <p:sp>
             <p:nvSpPr>
               <p:cNvPr id="9" name="TextBox 8">
@@ -3763,7 +3785,7 @@
             </p:nvSpPr>
             <p:spPr>
               <a:xfrm>
-                <a:off x="1675620" y="1538615"/>
+                <a:off x="1675620" y="1570365"/>
                 <a:ext cx="1531188" cy="261610"/>
               </a:xfrm>
               <a:prstGeom prst="rect">
@@ -3772,7 +3794,7 @@
               <a:blipFill>
                 <a:blip r:embed="rId3"/>
                 <a:stretch>
-                  <a:fillRect b="-18182"/>
+                  <a:fillRect b="-13636"/>
                 </a:stretch>
               </a:blipFill>
             </p:spPr>
@@ -3791,8 +3813,8 @@
           </p:sp>
         </mc:Fallback>
       </mc:AlternateContent>
-      <mc:AlternateContent xmlns:mc="http://schemas.openxmlformats.org/markup-compatibility/2006" xmlns:a14="http://schemas.microsoft.com/office/drawing/2010/main">
-        <mc:Choice Requires="a14">
+      <mc:AlternateContent xmlns:mc="http://schemas.openxmlformats.org/markup-compatibility/2006">
+        <mc:Choice xmlns:a14="http://schemas.microsoft.com/office/drawing/2010/main" Requires="a14">
           <p:sp>
             <p:nvSpPr>
               <p:cNvPr id="14" name="TextBox 13">
@@ -3807,7 +3829,7 @@
             </p:nvSpPr>
             <p:spPr>
               <a:xfrm>
-                <a:off x="817621" y="1412529"/>
+                <a:off x="817621" y="1415737"/>
                 <a:ext cx="295274" cy="261610"/>
               </a:xfrm>
               <a:prstGeom prst="rect">
@@ -3842,7 +3864,7 @@
             </p:txBody>
           </p:sp>
         </mc:Choice>
-        <mc:Fallback xmlns="">
+        <mc:Fallback>
           <p:sp>
             <p:nvSpPr>
               <p:cNvPr id="14" name="TextBox 13">
@@ -3859,7 +3881,7 @@
             </p:nvSpPr>
             <p:spPr>
               <a:xfrm>
-                <a:off x="817621" y="1412529"/>
+                <a:off x="817621" y="1415737"/>
                 <a:ext cx="295274" cy="261610"/>
               </a:xfrm>
               <a:prstGeom prst="rect">
@@ -3903,7 +3925,7 @@
         </p:nvCxnSpPr>
         <p:spPr>
           <a:xfrm flipV="1">
-            <a:off x="3473880" y="1379463"/>
+            <a:off x="4039030" y="1379463"/>
             <a:ext cx="0" cy="49619"/>
           </a:xfrm>
           <a:prstGeom prst="line">
@@ -3930,8 +3952,8 @@
           </a:fontRef>
         </p:style>
       </p:cxnSp>
-      <mc:AlternateContent xmlns:mc="http://schemas.openxmlformats.org/markup-compatibility/2006" xmlns:a14="http://schemas.microsoft.com/office/drawing/2010/main">
-        <mc:Choice Requires="a14">
+      <mc:AlternateContent xmlns:mc="http://schemas.openxmlformats.org/markup-compatibility/2006">
+        <mc:Choice xmlns:a14="http://schemas.microsoft.com/office/drawing/2010/main" Requires="a14">
           <p:sp>
             <p:nvSpPr>
               <p:cNvPr id="22" name="TextBox 21">
@@ -3946,7 +3968,7 @@
             </p:nvSpPr>
             <p:spPr>
               <a:xfrm>
-                <a:off x="3205141" y="1412529"/>
+                <a:off x="3770291" y="1415737"/>
                 <a:ext cx="559769" cy="261610"/>
               </a:xfrm>
               <a:prstGeom prst="rect">
@@ -3987,7 +4009,7 @@
             </p:txBody>
           </p:sp>
         </mc:Choice>
-        <mc:Fallback xmlns="">
+        <mc:Fallback>
           <p:sp>
             <p:nvSpPr>
               <p:cNvPr id="22" name="TextBox 21">
@@ -4004,7 +4026,7 @@
             </p:nvSpPr>
             <p:spPr>
               <a:xfrm>
-                <a:off x="3205141" y="1412529"/>
+                <a:off x="3770291" y="1415737"/>
                 <a:ext cx="559769" cy="261610"/>
               </a:xfrm>
               <a:prstGeom prst="rect">
@@ -4034,50 +4056,6 @@
       </mc:AlternateContent>
       <p:cxnSp>
         <p:nvCxnSpPr>
-          <p:cNvPr id="26" name="Straight Connector 25">
-            <a:extLst>
-              <a:ext uri="{FF2B5EF4-FFF2-40B4-BE49-F238E27FC236}">
-                <a16:creationId xmlns:a16="http://schemas.microsoft.com/office/drawing/2014/main" id="{FDAFFCD5-9C44-EBD3-27D9-81B7FB7EE290}"/>
-              </a:ext>
-            </a:extLst>
-          </p:cNvPr>
-          <p:cNvCxnSpPr>
-            <a:cxnSpLocks/>
-          </p:cNvCxnSpPr>
-          <p:nvPr/>
-        </p:nvCxnSpPr>
-        <p:spPr>
-          <a:xfrm flipV="1">
-            <a:off x="2272394" y="489866"/>
-            <a:ext cx="0" cy="939212"/>
-          </a:xfrm>
-          <a:prstGeom prst="line">
-            <a:avLst/>
-          </a:prstGeom>
-          <a:ln w="6350">
-            <a:solidFill>
-              <a:schemeClr val="tx1"/>
-            </a:solidFill>
-            <a:prstDash val="sysDash"/>
-          </a:ln>
-        </p:spPr>
-        <p:style>
-          <a:lnRef idx="1">
-            <a:schemeClr val="dk1"/>
-          </a:lnRef>
-          <a:fillRef idx="0">
-            <a:schemeClr val="dk1"/>
-          </a:fillRef>
-          <a:effectRef idx="0">
-            <a:schemeClr val="dk1"/>
-          </a:effectRef>
-          <a:fontRef idx="minor">
-            <a:schemeClr val="tx1"/>
-          </a:fontRef>
-        </p:style>
-      </p:cxnSp>
-      <p:cxnSp>
-        <p:nvCxnSpPr>
           <p:cNvPr id="28" name="Straight Arrow Connector 27">
             <a:extLst>
               <a:ext uri="{FF2B5EF4-FFF2-40B4-BE49-F238E27FC236}">
@@ -4092,8 +4070,8 @@
         </p:nvCxnSpPr>
         <p:spPr>
           <a:xfrm>
-            <a:off x="2528963" y="311081"/>
-            <a:ext cx="702000" cy="0"/>
+            <a:off x="1444625" y="560744"/>
+            <a:ext cx="1898650" cy="0"/>
           </a:xfrm>
           <a:prstGeom prst="straightConnector1">
             <a:avLst/>
@@ -4136,9 +4114,9 @@
           <p:nvPr/>
         </p:nvCxnSpPr>
         <p:spPr>
-          <a:xfrm>
-            <a:off x="1046980" y="296987"/>
-            <a:ext cx="979200" cy="0"/>
+          <a:xfrm flipV="1">
+            <a:off x="792452" y="560744"/>
+            <a:ext cx="525000" cy="3812"/>
           </a:xfrm>
           <a:prstGeom prst="straightConnector1">
             <a:avLst/>
@@ -4182,8 +4160,8 @@
             </p:nvSpPr>
             <p:spPr>
               <a:xfrm>
-                <a:off x="1193528" y="293174"/>
-                <a:ext cx="658986" cy="259495"/>
+                <a:off x="783825" y="537879"/>
+                <a:ext cx="542253" cy="259943"/>
               </a:xfrm>
               <a:prstGeom prst="rect">
                 <a:avLst/>
@@ -4203,8 +4181,8 @@
                       <m:jc m:val="centerGroup"/>
                     </m:oMathParaPr>
                     <m:oMath xmlns:m="http://schemas.openxmlformats.org/officeDocument/2006/math">
-                      <m:sSub>
-                        <m:sSubPr>
+                      <m:sSubSup>
+                        <m:sSubSupPr>
                           <m:ctrlPr>
                             <a:rPr lang="da-DK" sz="1000" b="1" i="1" smtClean="0">
                               <a:solidFill>
@@ -4214,7 +4192,7 @@
                               <a:cs typeface="Times New Roman" panose="02020603050405020304" pitchFamily="18" charset="0"/>
                             </a:rPr>
                           </m:ctrlPr>
-                        </m:sSubPr>
+                        </m:sSubSupPr>
                         <m:e>
                           <m:r>
                             <a:rPr lang="da-DK" sz="1000" b="1" i="1">
@@ -4229,54 +4207,29 @@
                         </m:e>
                         <m:sub>
                           <m:r>
-                            <a:rPr lang="da-DK" sz="1000" b="1" i="1">
+                            <a:rPr lang="da-DK" sz="1000" b="1" i="1" smtClean="0">
                               <a:solidFill>
                                 <a:srgbClr val="FF0000"/>
                               </a:solidFill>
                               <a:latin typeface="Cambria Math" panose="02040503050406030204" pitchFamily="18" charset="0"/>
                               <a:cs typeface="Times New Roman" panose="02020603050405020304" pitchFamily="18" charset="0"/>
                             </a:rPr>
-                            <m:t>𝑶</m:t>
+                            <m:t>𝑨𝒏𝒐𝒅𝒆</m:t>
                           </m:r>
-                          <m:sSub>
-                            <m:sSubPr>
-                              <m:ctrlPr>
-                                <a:rPr lang="da-DK" sz="1000" b="1" i="1" smtClean="0">
-                                  <a:solidFill>
-                                    <a:srgbClr val="FF0000"/>
-                                  </a:solidFill>
-                                  <a:latin typeface="Cambria Math" panose="02040503050406030204" pitchFamily="18" charset="0"/>
-                                  <a:cs typeface="Times New Roman" panose="02020603050405020304" pitchFamily="18" charset="0"/>
-                                </a:rPr>
-                              </m:ctrlPr>
-                            </m:sSubPr>
-                            <m:e>
-                              <m:r>
-                                <a:rPr lang="da-DK" sz="1000" b="1" i="1">
-                                  <a:solidFill>
-                                    <a:srgbClr val="FF0000"/>
-                                  </a:solidFill>
-                                  <a:latin typeface="Cambria Math" panose="02040503050406030204" pitchFamily="18" charset="0"/>
-                                  <a:cs typeface="Times New Roman" panose="02020603050405020304" pitchFamily="18" charset="0"/>
-                                </a:rPr>
-                                <m:t>𝑷</m:t>
-                              </m:r>
-                            </m:e>
-                            <m:sub>
-                              <m:r>
-                                <a:rPr lang="da-DK" sz="1000" b="1" i="1" smtClean="0">
-                                  <a:solidFill>
-                                    <a:srgbClr val="FF0000"/>
-                                  </a:solidFill>
-                                  <a:latin typeface="Cambria Math" panose="02040503050406030204" pitchFamily="18" charset="0"/>
-                                  <a:cs typeface="Times New Roman" panose="02020603050405020304" pitchFamily="18" charset="0"/>
-                                </a:rPr>
-                                <m:t>𝑻</m:t>
-                              </m:r>
-                            </m:sub>
-                          </m:sSub>
                         </m:sub>
-                      </m:sSub>
+                        <m:sup>
+                          <m:r>
+                            <a:rPr lang="da-DK" sz="1000" b="1" i="1" smtClean="0">
+                              <a:solidFill>
+                                <a:srgbClr val="FF0000"/>
+                              </a:solidFill>
+                              <a:latin typeface="Cambria Math" panose="02040503050406030204" pitchFamily="18" charset="0"/>
+                              <a:cs typeface="Times New Roman" panose="02020603050405020304" pitchFamily="18" charset="0"/>
+                            </a:rPr>
+                            <m:t>𝑶𝑷</m:t>
+                          </m:r>
+                        </m:sup>
+                      </m:sSubSup>
                     </m:oMath>
                   </m:oMathPara>
                 </a14:m>
@@ -4308,8 +4261,8 @@
             </p:nvSpPr>
             <p:spPr>
               <a:xfrm>
-                <a:off x="1193528" y="293174"/>
-                <a:ext cx="658986" cy="259495"/>
+                <a:off x="783825" y="537879"/>
+                <a:ext cx="542253" cy="259943"/>
               </a:xfrm>
               <a:prstGeom prst="rect">
                 <a:avLst/>
@@ -4317,7 +4270,7 @@
               <a:blipFill>
                 <a:blip r:embed="rId6"/>
                 <a:stretch>
-                  <a:fillRect/>
+                  <a:fillRect b="-4762"/>
                 </a:stretch>
               </a:blipFill>
             </p:spPr>
@@ -4336,8 +4289,8 @@
           </p:sp>
         </mc:Fallback>
       </mc:AlternateContent>
-      <mc:AlternateContent xmlns:mc="http://schemas.openxmlformats.org/markup-compatibility/2006" xmlns:a14="http://schemas.microsoft.com/office/drawing/2010/main">
-        <mc:Choice Requires="a14">
+      <mc:AlternateContent xmlns:mc="http://schemas.openxmlformats.org/markup-compatibility/2006">
+        <mc:Choice xmlns:a14="http://schemas.microsoft.com/office/drawing/2010/main" Requires="a14">
           <p:sp>
             <p:nvSpPr>
               <p:cNvPr id="33" name="TextBox 32">
@@ -4352,7 +4305,7 @@
             </p:nvSpPr>
             <p:spPr>
               <a:xfrm>
-                <a:off x="2671411" y="293175"/>
+                <a:off x="2202419" y="551601"/>
                 <a:ext cx="376723" cy="246221"/>
               </a:xfrm>
               <a:prstGeom prst="rect">
@@ -4424,7 +4377,7 @@
             </p:txBody>
           </p:sp>
         </mc:Choice>
-        <mc:Fallback xmlns="">
+        <mc:Fallback>
           <p:sp>
             <p:nvSpPr>
               <p:cNvPr id="33" name="TextBox 32">
@@ -4441,7 +4394,7 @@
             </p:nvSpPr>
             <p:spPr>
               <a:xfrm>
-                <a:off x="2671411" y="293175"/>
+                <a:off x="2202419" y="551601"/>
                 <a:ext cx="376723" cy="246221"/>
               </a:xfrm>
               <a:prstGeom prst="rect">
@@ -4593,8 +4546,8 @@
           </p:sp>
         </mc:Fallback>
       </mc:AlternateContent>
-      <mc:AlternateContent xmlns:mc="http://schemas.openxmlformats.org/markup-compatibility/2006" xmlns:a14="http://schemas.microsoft.com/office/drawing/2010/main">
-        <mc:Choice Requires="a14">
+      <mc:AlternateContent xmlns:mc="http://schemas.openxmlformats.org/markup-compatibility/2006">
+        <mc:Choice xmlns:a14="http://schemas.microsoft.com/office/drawing/2010/main" Requires="a14">
           <p:sp>
             <p:nvSpPr>
               <p:cNvPr id="37" name="TextBox 36">
@@ -4609,7 +4562,7 @@
             </p:nvSpPr>
             <p:spPr>
               <a:xfrm>
-                <a:off x="1336755" y="1120030"/>
+                <a:off x="1419305" y="1126380"/>
                 <a:ext cx="654666" cy="261610"/>
               </a:xfrm>
               <a:prstGeom prst="rect">
@@ -4687,7 +4640,7 @@
             </p:txBody>
           </p:sp>
         </mc:Choice>
-        <mc:Fallback xmlns="">
+        <mc:Fallback>
           <p:sp>
             <p:nvSpPr>
               <p:cNvPr id="37" name="TextBox 36">
@@ -4704,7 +4657,7 @@
             </p:nvSpPr>
             <p:spPr>
               <a:xfrm>
-                <a:off x="1336755" y="1120030"/>
+                <a:off x="1419305" y="1126380"/>
                 <a:ext cx="654666" cy="261610"/>
               </a:xfrm>
               <a:prstGeom prst="rect">
@@ -4713,7 +4666,7 @@
               <a:blipFill>
                 <a:blip r:embed="rId9"/>
                 <a:stretch>
-                  <a:fillRect b="-4762"/>
+                  <a:fillRect b="-4545"/>
                 </a:stretch>
               </a:blipFill>
             </p:spPr>
@@ -4732,8 +4685,8 @@
           </p:sp>
         </mc:Fallback>
       </mc:AlternateContent>
-      <mc:AlternateContent xmlns:mc="http://schemas.openxmlformats.org/markup-compatibility/2006" xmlns:a14="http://schemas.microsoft.com/office/drawing/2010/main">
-        <mc:Choice Requires="a14">
+      <mc:AlternateContent xmlns:mc="http://schemas.openxmlformats.org/markup-compatibility/2006">
+        <mc:Choice xmlns:a14="http://schemas.microsoft.com/office/drawing/2010/main" Requires="a14">
           <p:sp>
             <p:nvSpPr>
               <p:cNvPr id="38" name="TextBox 37">
@@ -4748,7 +4701,7 @@
             </p:nvSpPr>
             <p:spPr>
               <a:xfrm>
-                <a:off x="352997" y="144028"/>
+                <a:off x="352997" y="159612"/>
                 <a:ext cx="748345" cy="305918"/>
               </a:xfrm>
               <a:prstGeom prst="rect">
@@ -4817,7 +4770,7 @@
             </p:txBody>
           </p:sp>
         </mc:Choice>
-        <mc:Fallback xmlns="">
+        <mc:Fallback>
           <p:sp>
             <p:nvSpPr>
               <p:cNvPr id="38" name="TextBox 37">
@@ -4834,7 +4787,7 @@
             </p:nvSpPr>
             <p:spPr>
               <a:xfrm>
-                <a:off x="352997" y="144028"/>
+                <a:off x="352997" y="159612"/>
                 <a:ext cx="748345" cy="305918"/>
               </a:xfrm>
               <a:prstGeom prst="rect">
@@ -4862,8 +4815,8 @@
           </p:sp>
         </mc:Fallback>
       </mc:AlternateContent>
-      <mc:AlternateContent xmlns:mc="http://schemas.openxmlformats.org/markup-compatibility/2006" xmlns:a14="http://schemas.microsoft.com/office/drawing/2010/main">
-        <mc:Choice Requires="a14">
+      <mc:AlternateContent xmlns:mc="http://schemas.openxmlformats.org/markup-compatibility/2006">
+        <mc:Choice xmlns:a14="http://schemas.microsoft.com/office/drawing/2010/main" Requires="a14">
           <p:sp>
             <p:nvSpPr>
               <p:cNvPr id="43" name="TextBox 42">
@@ -4878,7 +4831,7 @@
             </p:nvSpPr>
             <p:spPr>
               <a:xfrm>
-                <a:off x="660745" y="747143"/>
+                <a:off x="619586" y="925535"/>
                 <a:ext cx="873681" cy="246221"/>
               </a:xfrm>
               <a:prstGeom prst="rect">
@@ -4948,7 +4901,7 @@
             </p:txBody>
           </p:sp>
         </mc:Choice>
-        <mc:Fallback xmlns="">
+        <mc:Fallback>
           <p:sp>
             <p:nvSpPr>
               <p:cNvPr id="43" name="TextBox 42">
@@ -4965,7 +4918,7 @@
             </p:nvSpPr>
             <p:spPr>
               <a:xfrm>
-                <a:off x="660745" y="747143"/>
+                <a:off x="619586" y="925535"/>
                 <a:ext cx="873681" cy="246221"/>
               </a:xfrm>
               <a:prstGeom prst="rect">
@@ -4974,7 +4927,7 @@
               <a:blipFill>
                 <a:blip r:embed="rId11"/>
                 <a:stretch>
-                  <a:fillRect b="-10000"/>
+                  <a:fillRect b="-9524"/>
                 </a:stretch>
               </a:blipFill>
             </p:spPr>
@@ -5009,8 +4962,8 @@
         </p:nvCxnSpPr>
         <p:spPr>
           <a:xfrm>
-            <a:off x="2042391" y="896783"/>
-            <a:ext cx="0" cy="353714"/>
+            <a:off x="2042391" y="1033308"/>
+            <a:ext cx="0" cy="216000"/>
           </a:xfrm>
           <a:prstGeom prst="line">
             <a:avLst/>
@@ -5039,8 +4992,8 @@
           </a:fontRef>
         </p:style>
       </p:cxnSp>
-      <mc:AlternateContent xmlns:mc="http://schemas.openxmlformats.org/markup-compatibility/2006" xmlns:a14="http://schemas.microsoft.com/office/drawing/2010/main">
-        <mc:Choice Requires="a14">
+      <mc:AlternateContent xmlns:mc="http://schemas.openxmlformats.org/markup-compatibility/2006">
+        <mc:Choice xmlns:a14="http://schemas.microsoft.com/office/drawing/2010/main" Requires="a14">
           <p:sp>
             <p:nvSpPr>
               <p:cNvPr id="55" name="TextBox 54">
@@ -5055,7 +5008,7 @@
             </p:nvSpPr>
             <p:spPr>
               <a:xfrm>
-                <a:off x="1580934" y="677816"/>
+                <a:off x="1580934" y="817516"/>
                 <a:ext cx="917687" cy="246221"/>
               </a:xfrm>
               <a:prstGeom prst="rect">
@@ -5126,7 +5079,7 @@
             </p:txBody>
           </p:sp>
         </mc:Choice>
-        <mc:Fallback xmlns="">
+        <mc:Fallback>
           <p:sp>
             <p:nvSpPr>
               <p:cNvPr id="55" name="TextBox 54">
@@ -5143,7 +5096,7 @@
             </p:nvSpPr>
             <p:spPr>
               <a:xfrm>
-                <a:off x="1580934" y="677816"/>
+                <a:off x="1580934" y="817516"/>
                 <a:ext cx="917687" cy="246221"/>
               </a:xfrm>
               <a:prstGeom prst="rect">
@@ -5171,8 +5124,8 @@
           </p:sp>
         </mc:Fallback>
       </mc:AlternateContent>
-      <mc:AlternateContent xmlns:mc="http://schemas.openxmlformats.org/markup-compatibility/2006" xmlns:a14="http://schemas.microsoft.com/office/drawing/2010/main">
-        <mc:Choice Requires="a14">
+      <mc:AlternateContent xmlns:mc="http://schemas.openxmlformats.org/markup-compatibility/2006">
+        <mc:Choice xmlns:a14="http://schemas.microsoft.com/office/drawing/2010/main" Requires="a14">
           <p:sp>
             <p:nvSpPr>
               <p:cNvPr id="40" name="TextBox 39">
@@ -5187,8 +5140,8 @@
             </p:nvSpPr>
             <p:spPr>
               <a:xfrm>
-                <a:off x="1956286" y="143391"/>
-                <a:ext cx="687431" cy="279307"/>
+                <a:off x="991807" y="186223"/>
+                <a:ext cx="782009" cy="279307"/>
               </a:xfrm>
               <a:prstGeom prst="rect">
                 <a:avLst/>
@@ -5241,7 +5194,7 @@
                               <a:latin typeface="Cambria Math" panose="02040503050406030204" pitchFamily="18" charset="0"/>
                               <a:cs typeface="Times New Roman" panose="02020603050405020304" pitchFamily="18" charset="0"/>
                             </a:rPr>
-                            <m:t>𝑴𝒊𝒅𝒅𝒍𝒆</m:t>
+                            <m:t>𝑹𝒆𝒂𝒍𝒊𝒔𝒕𝒊𝒄</m:t>
                           </m:r>
                         </m:sup>
                       </m:sSubSup>
@@ -5256,7 +5209,7 @@
             </p:txBody>
           </p:sp>
         </mc:Choice>
-        <mc:Fallback xmlns="">
+        <mc:Fallback>
           <p:sp>
             <p:nvSpPr>
               <p:cNvPr id="40" name="TextBox 39">
@@ -5273,8 +5226,8 @@
             </p:nvSpPr>
             <p:spPr>
               <a:xfrm>
-                <a:off x="1956286" y="143391"/>
-                <a:ext cx="687431" cy="279307"/>
+                <a:off x="991807" y="186223"/>
+                <a:ext cx="782009" cy="279307"/>
               </a:xfrm>
               <a:prstGeom prst="rect">
                 <a:avLst/>
@@ -5405,8 +5358,8 @@
         </p:nvCxnSpPr>
         <p:spPr>
           <a:xfrm>
-            <a:off x="270546" y="1388662"/>
-            <a:ext cx="590400" cy="0"/>
+            <a:off x="295946" y="1388662"/>
+            <a:ext cx="666000" cy="0"/>
           </a:xfrm>
           <a:prstGeom prst="line">
             <a:avLst/>
@@ -5432,8 +5385,8 @@
           </a:fontRef>
         </p:style>
       </p:cxnSp>
-      <mc:AlternateContent xmlns:mc="http://schemas.openxmlformats.org/markup-compatibility/2006" xmlns:a14="http://schemas.microsoft.com/office/drawing/2010/main">
-        <mc:Choice Requires="a14">
+      <mc:AlternateContent xmlns:mc="http://schemas.openxmlformats.org/markup-compatibility/2006">
+        <mc:Choice xmlns:a14="http://schemas.microsoft.com/office/drawing/2010/main" Requires="a14">
           <p:sp>
             <p:nvSpPr>
               <p:cNvPr id="42" name="TextBox 41">
@@ -5448,8 +5401,8 @@
             </p:nvSpPr>
             <p:spPr>
               <a:xfrm>
-                <a:off x="3139404" y="165962"/>
-                <a:ext cx="746743" cy="262059"/>
+                <a:off x="3704554" y="159612"/>
+                <a:ext cx="770788" cy="305918"/>
               </a:xfrm>
               <a:prstGeom prst="rect">
                 <a:avLst/>
@@ -5472,7 +5425,7 @@
                       <m:sSubSup>
                         <m:sSubSupPr>
                           <m:ctrlPr>
-                            <a:rPr lang="da-DK" sz="1100" b="1" i="1">
+                            <a:rPr lang="da-DK" sz="1100" b="1" i="1" smtClean="0">
                               <a:latin typeface="Cambria Math" panose="02040503050406030204" pitchFamily="18" charset="0"/>
                               <a:cs typeface="Times New Roman" panose="02020603050405020304" pitchFamily="18" charset="0"/>
                             </a:rPr>
@@ -5498,6 +5451,13 @@
                         </m:sub>
                         <m:sup>
                           <m:r>
+                            <a:rPr lang="da-DK" sz="1100" b="1" i="1" smtClean="0">
+                              <a:latin typeface="Cambria Math" panose="02040503050406030204" pitchFamily="18" charset="0"/>
+                              <a:cs typeface="Times New Roman" panose="02020603050405020304" pitchFamily="18" charset="0"/>
+                            </a:rPr>
+                            <m:t>𝑶𝒑𝒕𝒊𝒎𝒂𝒍</m:t>
+                          </m:r>
+                          <m:r>
                             <a:rPr lang="da-DK" sz="1100" b="1" i="1">
                               <a:latin typeface="Cambria Math" panose="02040503050406030204" pitchFamily="18" charset="0"/>
                               <a:cs typeface="Times New Roman" panose="02020603050405020304" pitchFamily="18" charset="0"/>
@@ -5517,7 +5477,7 @@
             </p:txBody>
           </p:sp>
         </mc:Choice>
-        <mc:Fallback xmlns="">
+        <mc:Fallback>
           <p:sp>
             <p:nvSpPr>
               <p:cNvPr id="42" name="TextBox 41">
@@ -5534,8 +5494,8 @@
             </p:nvSpPr>
             <p:spPr>
               <a:xfrm>
-                <a:off x="3139404" y="165962"/>
-                <a:ext cx="746743" cy="262059"/>
+                <a:off x="3704554" y="159612"/>
+                <a:ext cx="770788" cy="305918"/>
               </a:xfrm>
               <a:prstGeom prst="rect">
                 <a:avLst/>
@@ -5578,7 +5538,7 @@
         </p:nvCxnSpPr>
         <p:spPr>
           <a:xfrm flipV="1">
-            <a:off x="3477418" y="489866"/>
+            <a:off x="4042568" y="489866"/>
             <a:ext cx="0" cy="942754"/>
           </a:xfrm>
           <a:prstGeom prst="line">
@@ -5622,7 +5582,7 @@
         </p:nvCxnSpPr>
         <p:spPr>
           <a:xfrm>
-            <a:off x="860139" y="1407726"/>
+            <a:off x="968089" y="1407726"/>
             <a:ext cx="435691" cy="0"/>
           </a:xfrm>
           <a:prstGeom prst="line">
@@ -5665,7 +5625,7 @@
         </p:nvCxnSpPr>
         <p:spPr>
           <a:xfrm>
-            <a:off x="860139" y="1369486"/>
+            <a:off x="964914" y="1369486"/>
             <a:ext cx="435691" cy="0"/>
           </a:xfrm>
           <a:prstGeom prst="line">
@@ -5692,8 +5652,8 @@
           </a:fontRef>
         </p:style>
       </p:cxnSp>
-      <mc:AlternateContent xmlns:mc="http://schemas.openxmlformats.org/markup-compatibility/2006" xmlns:a14="http://schemas.microsoft.com/office/drawing/2010/main">
-        <mc:Choice Requires="a14">
+      <mc:AlternateContent xmlns:mc="http://schemas.openxmlformats.org/markup-compatibility/2006">
+        <mc:Choice xmlns:a14="http://schemas.microsoft.com/office/drawing/2010/main" Requires="a14">
           <p:sp>
             <p:nvSpPr>
               <p:cNvPr id="27" name="TextBox 26">
@@ -5708,7 +5668,7 @@
             </p:nvSpPr>
             <p:spPr>
               <a:xfrm>
-                <a:off x="2624836" y="1077272"/>
+                <a:off x="2460758" y="1096175"/>
                 <a:ext cx="514564" cy="169277"/>
               </a:xfrm>
               <a:prstGeom prst="rect">
@@ -5860,7 +5820,7 @@
             </p:txBody>
           </p:sp>
         </mc:Choice>
-        <mc:Fallback xmlns="">
+        <mc:Fallback>
           <p:sp>
             <p:nvSpPr>
               <p:cNvPr id="27" name="TextBox 26">
@@ -5877,7 +5837,7 @@
             </p:nvSpPr>
             <p:spPr>
               <a:xfrm>
-                <a:off x="2624836" y="1077272"/>
+                <a:off x="2460758" y="1096175"/>
                 <a:ext cx="514564" cy="169277"/>
               </a:xfrm>
               <a:prstGeom prst="rect">
@@ -5886,7 +5846,7 @@
               <a:blipFill>
                 <a:blip r:embed="rId15"/>
                 <a:stretch>
-                  <a:fillRect r="-4762" b="-42857"/>
+                  <a:fillRect t="-7143" r="-4762" b="-35714"/>
                 </a:stretch>
               </a:blipFill>
             </p:spPr>
@@ -5921,8 +5881,8 @@
         </p:nvCxnSpPr>
         <p:spPr>
           <a:xfrm>
-            <a:off x="1077980" y="967619"/>
-            <a:ext cx="0" cy="353714"/>
+            <a:off x="1182755" y="1120030"/>
+            <a:ext cx="0" cy="201303"/>
           </a:xfrm>
           <a:prstGeom prst="line">
             <a:avLst/>
@@ -5990,8 +5950,8 @@
           </a:fontRef>
         </p:style>
       </p:cxnSp>
-      <mc:AlternateContent xmlns:mc="http://schemas.openxmlformats.org/markup-compatibility/2006" xmlns:a14="http://schemas.microsoft.com/office/drawing/2010/main">
-        <mc:Choice Requires="a14">
+      <mc:AlternateContent xmlns:mc="http://schemas.openxmlformats.org/markup-compatibility/2006">
+        <mc:Choice xmlns:a14="http://schemas.microsoft.com/office/drawing/2010/main" Requires="a14">
           <p:sp>
             <p:nvSpPr>
               <p:cNvPr id="79" name="TextBox 78">
@@ -6006,7 +5966,7 @@
             </p:nvSpPr>
             <p:spPr>
               <a:xfrm>
-                <a:off x="288708" y="1412529"/>
+                <a:off x="288708" y="1415737"/>
                 <a:ext cx="665567" cy="261610"/>
               </a:xfrm>
               <a:prstGeom prst="rect">
@@ -6053,7 +6013,7 @@
             </p:txBody>
           </p:sp>
         </mc:Choice>
-        <mc:Fallback xmlns="">
+        <mc:Fallback>
           <p:sp>
             <p:nvSpPr>
               <p:cNvPr id="79" name="TextBox 78">
@@ -6070,7 +6030,7 @@
             </p:nvSpPr>
             <p:spPr>
               <a:xfrm>
-                <a:off x="288708" y="1412529"/>
+                <a:off x="288708" y="1415737"/>
                 <a:ext cx="665567" cy="261610"/>
               </a:xfrm>
               <a:prstGeom prst="rect">
@@ -6121,6 +6081,673 @@
             <a:avLst/>
           </a:prstGeom>
           <a:ln/>
+        </p:spPr>
+        <p:style>
+          <a:lnRef idx="1">
+            <a:schemeClr val="dk1"/>
+          </a:lnRef>
+          <a:fillRef idx="0">
+            <a:schemeClr val="dk1"/>
+          </a:fillRef>
+          <a:effectRef idx="0">
+            <a:schemeClr val="dk1"/>
+          </a:effectRef>
+          <a:fontRef idx="minor">
+            <a:schemeClr val="tx1"/>
+          </a:fontRef>
+        </p:style>
+      </p:cxnSp>
+      <p:cxnSp>
+        <p:nvCxnSpPr>
+          <p:cNvPr id="2" name="Straight Connector 1">
+            <a:extLst>
+              <a:ext uri="{FF2B5EF4-FFF2-40B4-BE49-F238E27FC236}">
+                <a16:creationId xmlns:a16="http://schemas.microsoft.com/office/drawing/2014/main" id="{58A3ECE4-67C4-0C72-5964-D407052AD3D9}"/>
+              </a:ext>
+            </a:extLst>
+          </p:cNvPr>
+          <p:cNvCxnSpPr>
+            <a:cxnSpLocks/>
+          </p:cNvCxnSpPr>
+          <p:nvPr/>
+        </p:nvCxnSpPr>
+        <p:spPr>
+          <a:xfrm flipV="1">
+            <a:off x="1400233" y="1350436"/>
+            <a:ext cx="0" cy="79200"/>
+          </a:xfrm>
+          <a:prstGeom prst="line">
+            <a:avLst/>
+          </a:prstGeom>
+          <a:ln/>
+        </p:spPr>
+        <p:style>
+          <a:lnRef idx="1">
+            <a:schemeClr val="dk1"/>
+          </a:lnRef>
+          <a:fillRef idx="0">
+            <a:schemeClr val="dk1"/>
+          </a:fillRef>
+          <a:effectRef idx="0">
+            <a:schemeClr val="dk1"/>
+          </a:effectRef>
+          <a:fontRef idx="minor">
+            <a:schemeClr val="tx1"/>
+          </a:fontRef>
+        </p:style>
+      </p:cxnSp>
+      <mc:AlternateContent xmlns:mc="http://schemas.openxmlformats.org/markup-compatibility/2006">
+        <mc:Choice xmlns:a14="http://schemas.microsoft.com/office/drawing/2010/main" Requires="a14">
+          <p:sp>
+            <p:nvSpPr>
+              <p:cNvPr id="6" name="TextBox 5">
+                <a:extLst>
+                  <a:ext uri="{FF2B5EF4-FFF2-40B4-BE49-F238E27FC236}">
+                    <a16:creationId xmlns:a16="http://schemas.microsoft.com/office/drawing/2014/main" id="{5F23478F-CF48-625E-8395-EFF909BE617E}"/>
+                  </a:ext>
+                </a:extLst>
+              </p:cNvPr>
+              <p:cNvSpPr txBox="1"/>
+              <p:nvPr/>
+            </p:nvSpPr>
+            <p:spPr>
+              <a:xfrm>
+                <a:off x="1164727" y="1415737"/>
+                <a:ext cx="401274" cy="261610"/>
+              </a:xfrm>
+              <a:prstGeom prst="rect">
+                <a:avLst/>
+              </a:prstGeom>
+              <a:noFill/>
+            </p:spPr>
+            <p:txBody>
+              <a:bodyPr wrap="square" rtlCol="0">
+                <a:spAutoFit/>
+              </a:bodyPr>
+              <a:lstStyle/>
+              <a:p>
+                <a:pPr/>
+                <a14:m>
+                  <m:oMathPara xmlns:m="http://schemas.openxmlformats.org/officeDocument/2006/math">
+                    <m:oMathParaPr>
+                      <m:jc m:val="centerGroup"/>
+                    </m:oMathParaPr>
+                    <m:oMath xmlns:m="http://schemas.openxmlformats.org/officeDocument/2006/math">
+                      <m:r>
+                        <a:rPr lang="da-DK" sz="1100" i="1" smtClean="0">
+                          <a:latin typeface="Cambria Math" panose="02040503050406030204" pitchFamily="18" charset="0"/>
+                        </a:rPr>
+                        <m:t>0</m:t>
+                      </m:r>
+                      <m:r>
+                        <a:rPr lang="da-DK" sz="1100" b="0" i="1" smtClean="0">
+                          <a:latin typeface="Cambria Math" panose="02040503050406030204" pitchFamily="18" charset="0"/>
+                        </a:rPr>
+                        <m:t>.40</m:t>
+                      </m:r>
+                    </m:oMath>
+                  </m:oMathPara>
+                </a14:m>
+                <a:endParaRPr lang="da-DK" sz="1100" dirty="0"/>
+              </a:p>
+            </p:txBody>
+          </p:sp>
+        </mc:Choice>
+        <mc:Fallback>
+          <p:sp>
+            <p:nvSpPr>
+              <p:cNvPr id="6" name="TextBox 5">
+                <a:extLst>
+                  <a:ext uri="{FF2B5EF4-FFF2-40B4-BE49-F238E27FC236}">
+                    <a16:creationId xmlns:a16="http://schemas.microsoft.com/office/drawing/2014/main" id="{5F23478F-CF48-625E-8395-EFF909BE617E}"/>
+                  </a:ext>
+                </a:extLst>
+              </p:cNvPr>
+              <p:cNvSpPr txBox="1">
+                <a:spLocks noRot="1" noChangeAspect="1" noMove="1" noResize="1" noEditPoints="1" noAdjustHandles="1" noChangeArrowheads="1" noChangeShapeType="1" noTextEdit="1"/>
+              </p:cNvSpPr>
+              <p:nvPr/>
+            </p:nvSpPr>
+            <p:spPr>
+              <a:xfrm>
+                <a:off x="1164727" y="1415737"/>
+                <a:ext cx="401274" cy="261610"/>
+              </a:xfrm>
+              <a:prstGeom prst="rect">
+                <a:avLst/>
+              </a:prstGeom>
+              <a:blipFill>
+                <a:blip r:embed="rId17"/>
+                <a:stretch>
+                  <a:fillRect/>
+                </a:stretch>
+              </a:blipFill>
+            </p:spPr>
+            <p:txBody>
+              <a:bodyPr/>
+              <a:lstStyle/>
+              <a:p>
+                <a:r>
+                  <a:rPr lang="da-DK">
+                    <a:noFill/>
+                  </a:rPr>
+                  <a:t> </a:t>
+                </a:r>
+              </a:p>
+            </p:txBody>
+          </p:sp>
+        </mc:Fallback>
+      </mc:AlternateContent>
+      <mc:AlternateContent xmlns:mc="http://schemas.openxmlformats.org/markup-compatibility/2006">
+        <mc:Choice xmlns:a14="http://schemas.microsoft.com/office/drawing/2010/main" Requires="a14">
+          <p:sp>
+            <p:nvSpPr>
+              <p:cNvPr id="7" name="TextBox 6">
+                <a:extLst>
+                  <a:ext uri="{FF2B5EF4-FFF2-40B4-BE49-F238E27FC236}">
+                    <a16:creationId xmlns:a16="http://schemas.microsoft.com/office/drawing/2014/main" id="{2F791B0A-E749-43B7-19AF-0A6881E44945}"/>
+                  </a:ext>
+                </a:extLst>
+              </p:cNvPr>
+              <p:cNvSpPr txBox="1"/>
+              <p:nvPr/>
+            </p:nvSpPr>
+            <p:spPr>
+              <a:xfrm>
+                <a:off x="3199127" y="1415737"/>
+                <a:ext cx="481222" cy="261610"/>
+              </a:xfrm>
+              <a:prstGeom prst="rect">
+                <a:avLst/>
+              </a:prstGeom>
+              <a:noFill/>
+            </p:spPr>
+            <p:txBody>
+              <a:bodyPr wrap="none" rtlCol="0">
+                <a:spAutoFit/>
+              </a:bodyPr>
+              <a:lstStyle/>
+              <a:p>
+                <a:pPr/>
+                <a14:m>
+                  <m:oMathPara xmlns:m="http://schemas.openxmlformats.org/officeDocument/2006/math">
+                    <m:oMathParaPr>
+                      <m:jc m:val="centerGroup"/>
+                    </m:oMathParaPr>
+                    <m:oMath xmlns:m="http://schemas.openxmlformats.org/officeDocument/2006/math">
+                      <m:r>
+                        <a:rPr lang="da-DK" sz="1100" b="0" i="1" smtClean="0">
+                          <a:latin typeface="Cambria Math" panose="02040503050406030204" pitchFamily="18" charset="0"/>
+                        </a:rPr>
+                        <m:t>0</m:t>
+                      </m:r>
+                      <m:r>
+                        <a:rPr lang="da-DK" sz="1100" i="1" smtClean="0">
+                          <a:latin typeface="Cambria Math" panose="02040503050406030204" pitchFamily="18" charset="0"/>
+                        </a:rPr>
+                        <m:t>.</m:t>
+                      </m:r>
+                      <m:r>
+                        <a:rPr lang="da-DK" sz="1100" i="1" smtClean="0">
+                          <a:latin typeface="Cambria Math" panose="02040503050406030204" pitchFamily="18" charset="0"/>
+                        </a:rPr>
+                        <m:t>9</m:t>
+                      </m:r>
+                      <m:r>
+                        <a:rPr lang="da-DK" sz="1100" b="0" i="0" smtClean="0">
+                          <a:latin typeface="Cambria Math" panose="02040503050406030204" pitchFamily="18" charset="0"/>
+                        </a:rPr>
+                        <m:t>0</m:t>
+                      </m:r>
+                    </m:oMath>
+                  </m:oMathPara>
+                </a14:m>
+                <a:endParaRPr lang="da-DK" sz="1100" dirty="0"/>
+              </a:p>
+            </p:txBody>
+          </p:sp>
+        </mc:Choice>
+        <mc:Fallback>
+          <p:sp>
+            <p:nvSpPr>
+              <p:cNvPr id="7" name="TextBox 6">
+                <a:extLst>
+                  <a:ext uri="{FF2B5EF4-FFF2-40B4-BE49-F238E27FC236}">
+                    <a16:creationId xmlns:a16="http://schemas.microsoft.com/office/drawing/2014/main" id="{2F791B0A-E749-43B7-19AF-0A6881E44945}"/>
+                  </a:ext>
+                </a:extLst>
+              </p:cNvPr>
+              <p:cNvSpPr txBox="1">
+                <a:spLocks noRot="1" noChangeAspect="1" noMove="1" noResize="1" noEditPoints="1" noAdjustHandles="1" noChangeArrowheads="1" noChangeShapeType="1" noTextEdit="1"/>
+              </p:cNvSpPr>
+              <p:nvPr/>
+            </p:nvSpPr>
+            <p:spPr>
+              <a:xfrm>
+                <a:off x="3199127" y="1415737"/>
+                <a:ext cx="481222" cy="261610"/>
+              </a:xfrm>
+              <a:prstGeom prst="rect">
+                <a:avLst/>
+              </a:prstGeom>
+              <a:blipFill>
+                <a:blip r:embed="rId18"/>
+                <a:stretch>
+                  <a:fillRect/>
+                </a:stretch>
+              </a:blipFill>
+            </p:spPr>
+            <p:txBody>
+              <a:bodyPr/>
+              <a:lstStyle/>
+              <a:p>
+                <a:r>
+                  <a:rPr lang="da-DK">
+                    <a:noFill/>
+                  </a:rPr>
+                  <a:t> </a:t>
+                </a:r>
+              </a:p>
+            </p:txBody>
+          </p:sp>
+        </mc:Fallback>
+      </mc:AlternateContent>
+      <p:cxnSp>
+        <p:nvCxnSpPr>
+          <p:cNvPr id="8" name="Straight Connector 7">
+            <a:extLst>
+              <a:ext uri="{FF2B5EF4-FFF2-40B4-BE49-F238E27FC236}">
+                <a16:creationId xmlns:a16="http://schemas.microsoft.com/office/drawing/2014/main" id="{98050EE1-6990-6D26-CCD2-FF1553818D32}"/>
+              </a:ext>
+            </a:extLst>
+          </p:cNvPr>
+          <p:cNvCxnSpPr>
+            <a:cxnSpLocks/>
+          </p:cNvCxnSpPr>
+          <p:nvPr/>
+        </p:nvCxnSpPr>
+        <p:spPr>
+          <a:xfrm flipV="1">
+            <a:off x="3409989" y="498475"/>
+            <a:ext cx="0" cy="936000"/>
+          </a:xfrm>
+          <a:prstGeom prst="line">
+            <a:avLst/>
+          </a:prstGeom>
+          <a:ln>
+            <a:prstDash val="dash"/>
+          </a:ln>
+        </p:spPr>
+        <p:style>
+          <a:lnRef idx="1">
+            <a:schemeClr val="dk1"/>
+          </a:lnRef>
+          <a:fillRef idx="0">
+            <a:schemeClr val="dk1"/>
+          </a:fillRef>
+          <a:effectRef idx="0">
+            <a:schemeClr val="dk1"/>
+          </a:effectRef>
+          <a:fontRef idx="minor">
+            <a:schemeClr val="tx1"/>
+          </a:fontRef>
+        </p:style>
+      </p:cxnSp>
+      <mc:AlternateContent xmlns:mc="http://schemas.openxmlformats.org/markup-compatibility/2006">
+        <mc:Choice xmlns:a14="http://schemas.microsoft.com/office/drawing/2010/main" Requires="a14">
+          <p:sp>
+            <p:nvSpPr>
+              <p:cNvPr id="12" name="TextBox 11">
+                <a:extLst>
+                  <a:ext uri="{FF2B5EF4-FFF2-40B4-BE49-F238E27FC236}">
+                    <a16:creationId xmlns:a16="http://schemas.microsoft.com/office/drawing/2014/main" id="{93878E95-F7DC-F6A0-A2F0-DC61CAD400F4}"/>
+                  </a:ext>
+                </a:extLst>
+              </p:cNvPr>
+              <p:cNvSpPr txBox="1"/>
+              <p:nvPr/>
+            </p:nvSpPr>
+            <p:spPr>
+              <a:xfrm>
+                <a:off x="3005991" y="186223"/>
+                <a:ext cx="804451" cy="279307"/>
+              </a:xfrm>
+              <a:prstGeom prst="rect">
+                <a:avLst/>
+              </a:prstGeom>
+              <a:noFill/>
+            </p:spPr>
+            <p:txBody>
+              <a:bodyPr wrap="none" rtlCol="0">
+                <a:spAutoFit/>
+              </a:bodyPr>
+              <a:lstStyle/>
+              <a:p>
+                <a:pPr/>
+                <a14:m>
+                  <m:oMathPara xmlns:m="http://schemas.openxmlformats.org/officeDocument/2006/math">
+                    <m:oMathParaPr>
+                      <m:jc m:val="centerGroup"/>
+                    </m:oMathParaPr>
+                    <m:oMath xmlns:m="http://schemas.openxmlformats.org/officeDocument/2006/math">
+                      <m:sSubSup>
+                        <m:sSubSupPr>
+                          <m:ctrlPr>
+                            <a:rPr lang="da-DK" sz="1100" b="1" i="1" smtClean="0">
+                              <a:latin typeface="Cambria Math" panose="02040503050406030204" pitchFamily="18" charset="0"/>
+                              <a:cs typeface="Times New Roman" panose="02020603050405020304" pitchFamily="18" charset="0"/>
+                            </a:rPr>
+                          </m:ctrlPr>
+                        </m:sSubSupPr>
+                        <m:e>
+                          <m:r>
+                            <a:rPr lang="da-DK" sz="1100" b="1" i="1">
+                              <a:latin typeface="Cambria Math" panose="02040503050406030204" pitchFamily="18" charset="0"/>
+                              <a:cs typeface="Times New Roman" panose="02020603050405020304" pitchFamily="18" charset="0"/>
+                            </a:rPr>
+                            <m:t>𝑼</m:t>
+                          </m:r>
+                        </m:e>
+                        <m:sub>
+                          <m:r>
+                            <a:rPr lang="da-DK" sz="1100" b="1" i="1">
+                              <a:latin typeface="Cambria Math" panose="02040503050406030204" pitchFamily="18" charset="0"/>
+                              <a:cs typeface="Times New Roman" panose="02020603050405020304" pitchFamily="18" charset="0"/>
+                            </a:rPr>
+                            <m:t>𝑪𝒂𝒕𝒉𝒐𝒅𝒆</m:t>
+                          </m:r>
+                        </m:sub>
+                        <m:sup>
+                          <m:r>
+                            <a:rPr lang="da-DK" sz="1100" b="1" i="1" smtClean="0">
+                              <a:latin typeface="Cambria Math" panose="02040503050406030204" pitchFamily="18" charset="0"/>
+                              <a:cs typeface="Times New Roman" panose="02020603050405020304" pitchFamily="18" charset="0"/>
+                            </a:rPr>
+                            <m:t>𝑹𝒆𝒂𝒍𝒊𝒔𝒕𝒊𝒄</m:t>
+                          </m:r>
+                          <m:r>
+                            <a:rPr lang="da-DK" sz="1100" b="1" i="1">
+                              <a:latin typeface="Cambria Math" panose="02040503050406030204" pitchFamily="18" charset="0"/>
+                              <a:cs typeface="Times New Roman" panose="02020603050405020304" pitchFamily="18" charset="0"/>
+                            </a:rPr>
+                            <m:t> </m:t>
+                          </m:r>
+                        </m:sup>
+                      </m:sSubSup>
+                    </m:oMath>
+                  </m:oMathPara>
+                </a14:m>
+                <a:endParaRPr lang="da-DK" sz="1100" b="1" dirty="0">
+                  <a:latin typeface="Times New Roman" panose="02020603050405020304" pitchFamily="18" charset="0"/>
+                  <a:cs typeface="Times New Roman" panose="02020603050405020304" pitchFamily="18" charset="0"/>
+                </a:endParaRPr>
+              </a:p>
+            </p:txBody>
+          </p:sp>
+        </mc:Choice>
+        <mc:Fallback>
+          <p:sp>
+            <p:nvSpPr>
+              <p:cNvPr id="12" name="TextBox 11">
+                <a:extLst>
+                  <a:ext uri="{FF2B5EF4-FFF2-40B4-BE49-F238E27FC236}">
+                    <a16:creationId xmlns:a16="http://schemas.microsoft.com/office/drawing/2014/main" id="{93878E95-F7DC-F6A0-A2F0-DC61CAD400F4}"/>
+                  </a:ext>
+                </a:extLst>
+              </p:cNvPr>
+              <p:cNvSpPr txBox="1">
+                <a:spLocks noRot="1" noChangeAspect="1" noMove="1" noResize="1" noEditPoints="1" noAdjustHandles="1" noChangeArrowheads="1" noChangeShapeType="1" noTextEdit="1"/>
+              </p:cNvSpPr>
+              <p:nvPr/>
+            </p:nvSpPr>
+            <p:spPr>
+              <a:xfrm>
+                <a:off x="3005991" y="186223"/>
+                <a:ext cx="804451" cy="279307"/>
+              </a:xfrm>
+              <a:prstGeom prst="rect">
+                <a:avLst/>
+              </a:prstGeom>
+              <a:blipFill>
+                <a:blip r:embed="rId19"/>
+                <a:stretch>
+                  <a:fillRect/>
+                </a:stretch>
+              </a:blipFill>
+            </p:spPr>
+            <p:txBody>
+              <a:bodyPr/>
+              <a:lstStyle/>
+              <a:p>
+                <a:r>
+                  <a:rPr lang="da-DK">
+                    <a:noFill/>
+                  </a:rPr>
+                  <a:t> </a:t>
+                </a:r>
+              </a:p>
+            </p:txBody>
+          </p:sp>
+        </mc:Fallback>
+      </mc:AlternateContent>
+      <p:cxnSp>
+        <p:nvCxnSpPr>
+          <p:cNvPr id="15" name="Straight Arrow Connector 14">
+            <a:extLst>
+              <a:ext uri="{FF2B5EF4-FFF2-40B4-BE49-F238E27FC236}">
+                <a16:creationId xmlns:a16="http://schemas.microsoft.com/office/drawing/2014/main" id="{F123DE69-5AF5-53D1-7EE0-C27E9F298EA3}"/>
+              </a:ext>
+            </a:extLst>
+          </p:cNvPr>
+          <p:cNvCxnSpPr>
+            <a:cxnSpLocks/>
+          </p:cNvCxnSpPr>
+          <p:nvPr/>
+        </p:nvCxnSpPr>
+        <p:spPr>
+          <a:xfrm flipV="1">
+            <a:off x="3462010" y="560744"/>
+            <a:ext cx="525000" cy="3812"/>
+          </a:xfrm>
+          <a:prstGeom prst="straightConnector1">
+            <a:avLst/>
+          </a:prstGeom>
+          <a:ln w="6350">
+            <a:solidFill>
+              <a:srgbClr val="FF0000"/>
+            </a:solidFill>
+            <a:headEnd type="triangle" w="med" len="med"/>
+            <a:tailEnd type="triangle" w="med" len="med"/>
+          </a:ln>
+        </p:spPr>
+        <p:style>
+          <a:lnRef idx="1">
+            <a:schemeClr val="accent1"/>
+          </a:lnRef>
+          <a:fillRef idx="0">
+            <a:schemeClr val="accent1"/>
+          </a:fillRef>
+          <a:effectRef idx="0">
+            <a:schemeClr val="accent1"/>
+          </a:effectRef>
+          <a:fontRef idx="minor">
+            <a:schemeClr val="tx1"/>
+          </a:fontRef>
+        </p:style>
+      </p:cxnSp>
+      <mc:AlternateContent xmlns:mc="http://schemas.openxmlformats.org/markup-compatibility/2006">
+        <mc:Choice xmlns:a14="http://schemas.microsoft.com/office/drawing/2010/main" Requires="a14">
+          <p:sp>
+            <p:nvSpPr>
+              <p:cNvPr id="18" name="TextBox 17">
+                <a:extLst>
+                  <a:ext uri="{FF2B5EF4-FFF2-40B4-BE49-F238E27FC236}">
+                    <a16:creationId xmlns:a16="http://schemas.microsoft.com/office/drawing/2014/main" id="{CAF50345-27BE-AF2C-0071-7755E10B06E8}"/>
+                  </a:ext>
+                </a:extLst>
+              </p:cNvPr>
+              <p:cNvSpPr txBox="1"/>
+              <p:nvPr/>
+            </p:nvSpPr>
+            <p:spPr>
+              <a:xfrm>
+                <a:off x="3424808" y="537879"/>
+                <a:ext cx="542253" cy="259943"/>
+              </a:xfrm>
+              <a:prstGeom prst="rect">
+                <a:avLst/>
+              </a:prstGeom>
+              <a:noFill/>
+            </p:spPr>
+            <p:txBody>
+              <a:bodyPr wrap="square" rtlCol="0">
+                <a:spAutoFit/>
+              </a:bodyPr>
+              <a:lstStyle/>
+              <a:p>
+                <a:pPr/>
+                <a14:m>
+                  <m:oMathPara xmlns:m="http://schemas.openxmlformats.org/officeDocument/2006/math">
+                    <m:oMathParaPr>
+                      <m:jc m:val="centerGroup"/>
+                    </m:oMathParaPr>
+                    <m:oMath xmlns:m="http://schemas.openxmlformats.org/officeDocument/2006/math">
+                      <m:sSubSup>
+                        <m:sSubSupPr>
+                          <m:ctrlPr>
+                            <a:rPr lang="da-DK" sz="1000" b="1" i="1" smtClean="0">
+                              <a:solidFill>
+                                <a:srgbClr val="FF0000"/>
+                              </a:solidFill>
+                              <a:latin typeface="Cambria Math" panose="02040503050406030204" pitchFamily="18" charset="0"/>
+                              <a:cs typeface="Times New Roman" panose="02020603050405020304" pitchFamily="18" charset="0"/>
+                            </a:rPr>
+                          </m:ctrlPr>
+                        </m:sSubSupPr>
+                        <m:e>
+                          <m:r>
+                            <a:rPr lang="da-DK" sz="1000" b="1" i="1">
+                              <a:solidFill>
+                                <a:srgbClr val="FF0000"/>
+                              </a:solidFill>
+                              <a:latin typeface="Cambria Math" panose="02040503050406030204" pitchFamily="18" charset="0"/>
+                              <a:cs typeface="Times New Roman" panose="02020603050405020304" pitchFamily="18" charset="0"/>
+                            </a:rPr>
+                            <m:t>𝑼</m:t>
+                          </m:r>
+                        </m:e>
+                        <m:sub>
+                          <m:r>
+                            <a:rPr lang="da-DK" sz="1000" b="1" i="1" smtClean="0">
+                              <a:solidFill>
+                                <a:srgbClr val="FF0000"/>
+                              </a:solidFill>
+                              <a:latin typeface="Cambria Math" panose="02040503050406030204" pitchFamily="18" charset="0"/>
+                              <a:cs typeface="Times New Roman" panose="02020603050405020304" pitchFamily="18" charset="0"/>
+                            </a:rPr>
+                            <m:t>𝑪𝒂𝒕𝒉𝒐𝒅𝒆</m:t>
+                          </m:r>
+                        </m:sub>
+                        <m:sup>
+                          <m:r>
+                            <a:rPr lang="da-DK" sz="1000" b="1" i="1" smtClean="0">
+                              <a:solidFill>
+                                <a:srgbClr val="FF0000"/>
+                              </a:solidFill>
+                              <a:latin typeface="Cambria Math" panose="02040503050406030204" pitchFamily="18" charset="0"/>
+                              <a:cs typeface="Times New Roman" panose="02020603050405020304" pitchFamily="18" charset="0"/>
+                            </a:rPr>
+                            <m:t>𝑶𝑷</m:t>
+                          </m:r>
+                        </m:sup>
+                      </m:sSubSup>
+                    </m:oMath>
+                  </m:oMathPara>
+                </a14:m>
+                <a:endParaRPr lang="da-DK" sz="1000" b="1" dirty="0">
+                  <a:solidFill>
+                    <a:srgbClr val="FF0000"/>
+                  </a:solidFill>
+                  <a:latin typeface="Times New Roman" panose="02020603050405020304" pitchFamily="18" charset="0"/>
+                  <a:cs typeface="Times New Roman" panose="02020603050405020304" pitchFamily="18" charset="0"/>
+                </a:endParaRPr>
+              </a:p>
+            </p:txBody>
+          </p:sp>
+        </mc:Choice>
+        <mc:Fallback>
+          <p:sp>
+            <p:nvSpPr>
+              <p:cNvPr id="18" name="TextBox 17">
+                <a:extLst>
+                  <a:ext uri="{FF2B5EF4-FFF2-40B4-BE49-F238E27FC236}">
+                    <a16:creationId xmlns:a16="http://schemas.microsoft.com/office/drawing/2014/main" id="{CAF50345-27BE-AF2C-0071-7755E10B06E8}"/>
+                  </a:ext>
+                </a:extLst>
+              </p:cNvPr>
+              <p:cNvSpPr txBox="1">
+                <a:spLocks noRot="1" noChangeAspect="1" noMove="1" noResize="1" noEditPoints="1" noAdjustHandles="1" noChangeArrowheads="1" noChangeShapeType="1" noTextEdit="1"/>
+              </p:cNvSpPr>
+              <p:nvPr/>
+            </p:nvSpPr>
+            <p:spPr>
+              <a:xfrm>
+                <a:off x="3424808" y="537879"/>
+                <a:ext cx="542253" cy="259943"/>
+              </a:xfrm>
+              <a:prstGeom prst="rect">
+                <a:avLst/>
+              </a:prstGeom>
+              <a:blipFill>
+                <a:blip r:embed="rId20"/>
+                <a:stretch>
+                  <a:fillRect r="-11364" b="-4762"/>
+                </a:stretch>
+              </a:blipFill>
+            </p:spPr>
+            <p:txBody>
+              <a:bodyPr/>
+              <a:lstStyle/>
+              <a:p>
+                <a:r>
+                  <a:rPr lang="da-DK">
+                    <a:noFill/>
+                  </a:rPr>
+                  <a:t> </a:t>
+                </a:r>
+              </a:p>
+            </p:txBody>
+          </p:sp>
+        </mc:Fallback>
+      </mc:AlternateContent>
+      <p:cxnSp>
+        <p:nvCxnSpPr>
+          <p:cNvPr id="26" name="Straight Connector 25">
+            <a:extLst>
+              <a:ext uri="{FF2B5EF4-FFF2-40B4-BE49-F238E27FC236}">
+                <a16:creationId xmlns:a16="http://schemas.microsoft.com/office/drawing/2014/main" id="{FDAFFCD5-9C44-EBD3-27D9-81B7FB7EE290}"/>
+              </a:ext>
+            </a:extLst>
+          </p:cNvPr>
+          <p:cNvCxnSpPr>
+            <a:cxnSpLocks/>
+          </p:cNvCxnSpPr>
+          <p:nvPr/>
+        </p:nvCxnSpPr>
+        <p:spPr>
+          <a:xfrm flipV="1">
+            <a:off x="1373869" y="489866"/>
+            <a:ext cx="0" cy="939212"/>
+          </a:xfrm>
+          <a:prstGeom prst="line">
+            <a:avLst/>
+          </a:prstGeom>
+          <a:ln w="6350">
+            <a:solidFill>
+              <a:schemeClr val="tx1"/>
+            </a:solidFill>
+            <a:prstDash val="dash"/>
+          </a:ln>
         </p:spPr>
         <p:style>
           <a:lnRef idx="1">

</xml_diff>

<commit_message>
I think i fetched some figures for the PtX course
</commit_message>
<xml_diff>
--- a/Writing/Thesis_Figures/Coverage vs Potential.pptx
+++ b/Writing/Thesis_Figures/Coverage vs Potential.pptx
@@ -197,7 +197,7 @@
           <a:p>
             <a:fld id="{7E4BB161-6267-C445-BC81-AB27B91176B9}" type="datetimeFigureOut">
               <a:rPr lang="da-DK" smtClean="0"/>
-              <a:t>21.10.2023</a:t>
+              <a:t>22.11.2023</a:t>
             </a:fld>
             <a:endParaRPr lang="da-DK"/>
           </a:p>
@@ -923,7 +923,7 @@
           <a:p>
             <a:fld id="{400C526F-8F77-6B40-B8A1-3042D0049435}" type="datetimeFigureOut">
               <a:rPr lang="da-DK" smtClean="0"/>
-              <a:t>21.10.2023</a:t>
+              <a:t>22.11.2023</a:t>
             </a:fld>
             <a:endParaRPr lang="da-DK"/>
           </a:p>
@@ -1093,7 +1093,7 @@
           <a:p>
             <a:fld id="{400C526F-8F77-6B40-B8A1-3042D0049435}" type="datetimeFigureOut">
               <a:rPr lang="da-DK" smtClean="0"/>
-              <a:t>21.10.2023</a:t>
+              <a:t>22.11.2023</a:t>
             </a:fld>
             <a:endParaRPr lang="da-DK"/>
           </a:p>
@@ -1273,7 +1273,7 @@
           <a:p>
             <a:fld id="{400C526F-8F77-6B40-B8A1-3042D0049435}" type="datetimeFigureOut">
               <a:rPr lang="da-DK" smtClean="0"/>
-              <a:t>21.10.2023</a:t>
+              <a:t>22.11.2023</a:t>
             </a:fld>
             <a:endParaRPr lang="da-DK"/>
           </a:p>
@@ -1443,7 +1443,7 @@
           <a:p>
             <a:fld id="{400C526F-8F77-6B40-B8A1-3042D0049435}" type="datetimeFigureOut">
               <a:rPr lang="da-DK" smtClean="0"/>
-              <a:t>21.10.2023</a:t>
+              <a:t>22.11.2023</a:t>
             </a:fld>
             <a:endParaRPr lang="da-DK"/>
           </a:p>
@@ -1689,7 +1689,7 @@
           <a:p>
             <a:fld id="{400C526F-8F77-6B40-B8A1-3042D0049435}" type="datetimeFigureOut">
               <a:rPr lang="da-DK" smtClean="0"/>
-              <a:t>21.10.2023</a:t>
+              <a:t>22.11.2023</a:t>
             </a:fld>
             <a:endParaRPr lang="da-DK"/>
           </a:p>
@@ -1921,7 +1921,7 @@
           <a:p>
             <a:fld id="{400C526F-8F77-6B40-B8A1-3042D0049435}" type="datetimeFigureOut">
               <a:rPr lang="da-DK" smtClean="0"/>
-              <a:t>21.10.2023</a:t>
+              <a:t>22.11.2023</a:t>
             </a:fld>
             <a:endParaRPr lang="da-DK"/>
           </a:p>
@@ -2288,7 +2288,7 @@
           <a:p>
             <a:fld id="{400C526F-8F77-6B40-B8A1-3042D0049435}" type="datetimeFigureOut">
               <a:rPr lang="da-DK" smtClean="0"/>
-              <a:t>21.10.2023</a:t>
+              <a:t>22.11.2023</a:t>
             </a:fld>
             <a:endParaRPr lang="da-DK"/>
           </a:p>
@@ -2406,7 +2406,7 @@
           <a:p>
             <a:fld id="{400C526F-8F77-6B40-B8A1-3042D0049435}" type="datetimeFigureOut">
               <a:rPr lang="da-DK" smtClean="0"/>
-              <a:t>21.10.2023</a:t>
+              <a:t>22.11.2023</a:t>
             </a:fld>
             <a:endParaRPr lang="da-DK"/>
           </a:p>
@@ -2501,7 +2501,7 @@
           <a:p>
             <a:fld id="{400C526F-8F77-6B40-B8A1-3042D0049435}" type="datetimeFigureOut">
               <a:rPr lang="da-DK" smtClean="0"/>
-              <a:t>21.10.2023</a:t>
+              <a:t>22.11.2023</a:t>
             </a:fld>
             <a:endParaRPr lang="da-DK"/>
           </a:p>
@@ -2778,7 +2778,7 @@
           <a:p>
             <a:fld id="{400C526F-8F77-6B40-B8A1-3042D0049435}" type="datetimeFigureOut">
               <a:rPr lang="da-DK" smtClean="0"/>
-              <a:t>21.10.2023</a:t>
+              <a:t>22.11.2023</a:t>
             </a:fld>
             <a:endParaRPr lang="da-DK"/>
           </a:p>
@@ -3035,7 +3035,7 @@
           <a:p>
             <a:fld id="{400C526F-8F77-6B40-B8A1-3042D0049435}" type="datetimeFigureOut">
               <a:rPr lang="da-DK" smtClean="0"/>
-              <a:t>21.10.2023</a:t>
+              <a:t>22.11.2023</a:t>
             </a:fld>
             <a:endParaRPr lang="da-DK"/>
           </a:p>
@@ -3248,7 +3248,7 @@
           <a:p>
             <a:fld id="{400C526F-8F77-6B40-B8A1-3042D0049435}" type="datetimeFigureOut">
               <a:rPr lang="da-DK" smtClean="0"/>
-              <a:t>21.10.2023</a:t>
+              <a:t>22.11.2023</a:t>
             </a:fld>
             <a:endParaRPr lang="da-DK"/>
           </a:p>
@@ -3698,8 +3698,8 @@
           </a:fontRef>
         </p:style>
       </p:cxnSp>
-      <mc:AlternateContent xmlns:mc="http://schemas.openxmlformats.org/markup-compatibility/2006">
-        <mc:Choice xmlns:a14="http://schemas.microsoft.com/office/drawing/2010/main" Requires="a14">
+      <mc:AlternateContent xmlns:mc="http://schemas.openxmlformats.org/markup-compatibility/2006" xmlns:a14="http://schemas.microsoft.com/office/drawing/2010/main">
+        <mc:Choice Requires="a14">
           <p:sp>
             <p:nvSpPr>
               <p:cNvPr id="9" name="TextBox 8">
@@ -3768,7 +3768,7 @@
             </p:txBody>
           </p:sp>
         </mc:Choice>
-        <mc:Fallback>
+        <mc:Fallback xmlns="">
           <p:sp>
             <p:nvSpPr>
               <p:cNvPr id="9" name="TextBox 8">
@@ -3813,8 +3813,8 @@
           </p:sp>
         </mc:Fallback>
       </mc:AlternateContent>
-      <mc:AlternateContent xmlns:mc="http://schemas.openxmlformats.org/markup-compatibility/2006">
-        <mc:Choice xmlns:a14="http://schemas.microsoft.com/office/drawing/2010/main" Requires="a14">
+      <mc:AlternateContent xmlns:mc="http://schemas.openxmlformats.org/markup-compatibility/2006" xmlns:a14="http://schemas.microsoft.com/office/drawing/2010/main">
+        <mc:Choice Requires="a14">
           <p:sp>
             <p:nvSpPr>
               <p:cNvPr id="14" name="TextBox 13">
@@ -3864,7 +3864,7 @@
             </p:txBody>
           </p:sp>
         </mc:Choice>
-        <mc:Fallback>
+        <mc:Fallback xmlns="">
           <p:sp>
             <p:nvSpPr>
               <p:cNvPr id="14" name="TextBox 13">
@@ -3952,8 +3952,8 @@
           </a:fontRef>
         </p:style>
       </p:cxnSp>
-      <mc:AlternateContent xmlns:mc="http://schemas.openxmlformats.org/markup-compatibility/2006">
-        <mc:Choice xmlns:a14="http://schemas.microsoft.com/office/drawing/2010/main" Requires="a14">
+      <mc:AlternateContent xmlns:mc="http://schemas.openxmlformats.org/markup-compatibility/2006" xmlns:a14="http://schemas.microsoft.com/office/drawing/2010/main">
+        <mc:Choice Requires="a14">
           <p:sp>
             <p:nvSpPr>
               <p:cNvPr id="22" name="TextBox 21">
@@ -4009,7 +4009,7 @@
             </p:txBody>
           </p:sp>
         </mc:Choice>
-        <mc:Fallback>
+        <mc:Fallback xmlns="">
           <p:sp>
             <p:nvSpPr>
               <p:cNvPr id="22" name="TextBox 21">
@@ -4144,8 +4144,8 @@
           </a:fontRef>
         </p:style>
       </p:cxnSp>
-      <mc:AlternateContent xmlns:mc="http://schemas.openxmlformats.org/markup-compatibility/2006">
-        <mc:Choice xmlns:a14="http://schemas.microsoft.com/office/drawing/2010/main" Requires="a14">
+      <mc:AlternateContent xmlns:mc="http://schemas.openxmlformats.org/markup-compatibility/2006" xmlns:a14="http://schemas.microsoft.com/office/drawing/2010/main">
+        <mc:Choice Requires="a14">
           <p:sp>
             <p:nvSpPr>
               <p:cNvPr id="32" name="TextBox 31">
@@ -4244,7 +4244,7 @@
             </p:txBody>
           </p:sp>
         </mc:Choice>
-        <mc:Fallback>
+        <mc:Fallback xmlns="">
           <p:sp>
             <p:nvSpPr>
               <p:cNvPr id="32" name="TextBox 31">
@@ -4289,8 +4289,8 @@
           </p:sp>
         </mc:Fallback>
       </mc:AlternateContent>
-      <mc:AlternateContent xmlns:mc="http://schemas.openxmlformats.org/markup-compatibility/2006">
-        <mc:Choice xmlns:a14="http://schemas.microsoft.com/office/drawing/2010/main" Requires="a14">
+      <mc:AlternateContent xmlns:mc="http://schemas.openxmlformats.org/markup-compatibility/2006" xmlns:a14="http://schemas.microsoft.com/office/drawing/2010/main">
+        <mc:Choice Requires="a14">
           <p:sp>
             <p:nvSpPr>
               <p:cNvPr id="33" name="TextBox 32">
@@ -4377,7 +4377,7 @@
             </p:txBody>
           </p:sp>
         </mc:Choice>
-        <mc:Fallback>
+        <mc:Fallback xmlns="">
           <p:sp>
             <p:nvSpPr>
               <p:cNvPr id="33" name="TextBox 32">
@@ -4546,8 +4546,8 @@
           </p:sp>
         </mc:Fallback>
       </mc:AlternateContent>
-      <mc:AlternateContent xmlns:mc="http://schemas.openxmlformats.org/markup-compatibility/2006">
-        <mc:Choice xmlns:a14="http://schemas.microsoft.com/office/drawing/2010/main" Requires="a14">
+      <mc:AlternateContent xmlns:mc="http://schemas.openxmlformats.org/markup-compatibility/2006" xmlns:a14="http://schemas.microsoft.com/office/drawing/2010/main">
+        <mc:Choice Requires="a14">
           <p:sp>
             <p:nvSpPr>
               <p:cNvPr id="37" name="TextBox 36">
@@ -4640,7 +4640,7 @@
             </p:txBody>
           </p:sp>
         </mc:Choice>
-        <mc:Fallback>
+        <mc:Fallback xmlns="">
           <p:sp>
             <p:nvSpPr>
               <p:cNvPr id="37" name="TextBox 36">
@@ -4702,7 +4702,7 @@
             <p:spPr>
               <a:xfrm>
                 <a:off x="352997" y="159612"/>
-                <a:ext cx="748345" cy="305918"/>
+                <a:ext cx="645753" cy="279244"/>
               </a:xfrm>
               <a:prstGeom prst="rect">
                 <a:avLst/>
@@ -4725,7 +4725,7 @@
                       <m:sSubSup>
                         <m:sSubSupPr>
                           <m:ctrlPr>
-                            <a:rPr lang="da-DK" sz="1100" b="1" i="1">
+                            <a:rPr lang="da-DK" sz="1100" b="1" i="1" smtClean="0">
                               <a:latin typeface="Cambria Math" panose="02040503050406030204" pitchFamily="18" charset="0"/>
                               <a:cs typeface="Times New Roman" panose="02020603050405020304" pitchFamily="18" charset="0"/>
                             </a:rPr>
@@ -4751,11 +4751,11 @@
                         </m:sub>
                         <m:sup>
                           <m:r>
-                            <a:rPr lang="da-DK" sz="1100" b="1" i="1">
+                            <a:rPr lang="da-DK" sz="1100" b="1" i="1" smtClean="0">
                               <a:latin typeface="Cambria Math" panose="02040503050406030204" pitchFamily="18" charset="0"/>
                               <a:cs typeface="Times New Roman" panose="02020603050405020304" pitchFamily="18" charset="0"/>
                             </a:rPr>
-                            <m:t>𝑶𝒑𝒕𝒊𝒎𝒂𝒍</m:t>
+                            <m:t>𝑰𝒅𝒆𝒂𝒍</m:t>
                           </m:r>
                         </m:sup>
                       </m:sSubSup>
@@ -4788,7 +4788,7 @@
             <p:spPr>
               <a:xfrm>
                 <a:off x="352997" y="159612"/>
-                <a:ext cx="748345" cy="305918"/>
+                <a:ext cx="645753" cy="279244"/>
               </a:xfrm>
               <a:prstGeom prst="rect">
                 <a:avLst/>
@@ -4815,8 +4815,8 @@
           </p:sp>
         </mc:Fallback>
       </mc:AlternateContent>
-      <mc:AlternateContent xmlns:mc="http://schemas.openxmlformats.org/markup-compatibility/2006">
-        <mc:Choice xmlns:a14="http://schemas.microsoft.com/office/drawing/2010/main" Requires="a14">
+      <mc:AlternateContent xmlns:mc="http://schemas.openxmlformats.org/markup-compatibility/2006" xmlns:a14="http://schemas.microsoft.com/office/drawing/2010/main">
+        <mc:Choice Requires="a14">
           <p:sp>
             <p:nvSpPr>
               <p:cNvPr id="43" name="TextBox 42">
@@ -4901,7 +4901,7 @@
             </p:txBody>
           </p:sp>
         </mc:Choice>
-        <mc:Fallback>
+        <mc:Fallback xmlns="">
           <p:sp>
             <p:nvSpPr>
               <p:cNvPr id="43" name="TextBox 42">
@@ -4992,8 +4992,8 @@
           </a:fontRef>
         </p:style>
       </p:cxnSp>
-      <mc:AlternateContent xmlns:mc="http://schemas.openxmlformats.org/markup-compatibility/2006">
-        <mc:Choice xmlns:a14="http://schemas.microsoft.com/office/drawing/2010/main" Requires="a14">
+      <mc:AlternateContent xmlns:mc="http://schemas.openxmlformats.org/markup-compatibility/2006" xmlns:a14="http://schemas.microsoft.com/office/drawing/2010/main">
+        <mc:Choice Requires="a14">
           <p:sp>
             <p:nvSpPr>
               <p:cNvPr id="55" name="TextBox 54">
@@ -5079,7 +5079,7 @@
             </p:txBody>
           </p:sp>
         </mc:Choice>
-        <mc:Fallback>
+        <mc:Fallback xmlns="">
           <p:sp>
             <p:nvSpPr>
               <p:cNvPr id="55" name="TextBox 54">
@@ -5141,7 +5141,7 @@
             <p:spPr>
               <a:xfrm>
                 <a:off x="991807" y="186223"/>
-                <a:ext cx="782009" cy="279307"/>
+                <a:ext cx="748345" cy="305918"/>
               </a:xfrm>
               <a:prstGeom prst="rect">
                 <a:avLst/>
@@ -5194,7 +5194,7 @@
                               <a:latin typeface="Cambria Math" panose="02040503050406030204" pitchFamily="18" charset="0"/>
                               <a:cs typeface="Times New Roman" panose="02020603050405020304" pitchFamily="18" charset="0"/>
                             </a:rPr>
-                            <m:t>𝑹𝒆𝒂𝒍𝒊𝒔𝒕𝒊𝒄</m:t>
+                            <m:t>𝑶𝒑𝒕𝒊𝒎𝒂𝒍</m:t>
                           </m:r>
                         </m:sup>
                       </m:sSubSup>
@@ -5227,7 +5227,7 @@
             <p:spPr>
               <a:xfrm>
                 <a:off x="991807" y="186223"/>
-                <a:ext cx="782009" cy="279307"/>
+                <a:ext cx="748345" cy="305918"/>
               </a:xfrm>
               <a:prstGeom prst="rect">
                 <a:avLst/>
@@ -5402,7 +5402,7 @@
             <p:spPr>
               <a:xfrm>
                 <a:off x="3704554" y="159612"/>
-                <a:ext cx="770788" cy="305918"/>
+                <a:ext cx="746743" cy="279244"/>
               </a:xfrm>
               <a:prstGeom prst="rect">
                 <a:avLst/>
@@ -5455,7 +5455,7 @@
                               <a:latin typeface="Cambria Math" panose="02040503050406030204" pitchFamily="18" charset="0"/>
                               <a:cs typeface="Times New Roman" panose="02020603050405020304" pitchFamily="18" charset="0"/>
                             </a:rPr>
-                            <m:t>𝑶𝒑𝒕𝒊𝒎𝒂𝒍</m:t>
+                            <m:t>𝑰𝒅𝒆𝒂𝒍</m:t>
                           </m:r>
                           <m:r>
                             <a:rPr lang="da-DK" sz="1100" b="1" i="1">
@@ -5495,7 +5495,7 @@
             <p:spPr>
               <a:xfrm>
                 <a:off x="3704554" y="159612"/>
-                <a:ext cx="770788" cy="305918"/>
+                <a:ext cx="746743" cy="279244"/>
               </a:xfrm>
               <a:prstGeom prst="rect">
                 <a:avLst/>
@@ -5652,8 +5652,8 @@
           </a:fontRef>
         </p:style>
       </p:cxnSp>
-      <mc:AlternateContent xmlns:mc="http://schemas.openxmlformats.org/markup-compatibility/2006">
-        <mc:Choice xmlns:a14="http://schemas.microsoft.com/office/drawing/2010/main" Requires="a14">
+      <mc:AlternateContent xmlns:mc="http://schemas.openxmlformats.org/markup-compatibility/2006" xmlns:a14="http://schemas.microsoft.com/office/drawing/2010/main">
+        <mc:Choice Requires="a14">
           <p:sp>
             <p:nvSpPr>
               <p:cNvPr id="27" name="TextBox 26">
@@ -5820,7 +5820,7 @@
             </p:txBody>
           </p:sp>
         </mc:Choice>
-        <mc:Fallback>
+        <mc:Fallback xmlns="">
           <p:sp>
             <p:nvSpPr>
               <p:cNvPr id="27" name="TextBox 26">
@@ -5950,8 +5950,8 @@
           </a:fontRef>
         </p:style>
       </p:cxnSp>
-      <mc:AlternateContent xmlns:mc="http://schemas.openxmlformats.org/markup-compatibility/2006">
-        <mc:Choice xmlns:a14="http://schemas.microsoft.com/office/drawing/2010/main" Requires="a14">
+      <mc:AlternateContent xmlns:mc="http://schemas.openxmlformats.org/markup-compatibility/2006" xmlns:a14="http://schemas.microsoft.com/office/drawing/2010/main">
+        <mc:Choice Requires="a14">
           <p:sp>
             <p:nvSpPr>
               <p:cNvPr id="79" name="TextBox 78">
@@ -6013,7 +6013,7 @@
             </p:txBody>
           </p:sp>
         </mc:Choice>
-        <mc:Fallback>
+        <mc:Fallback xmlns="">
           <p:sp>
             <p:nvSpPr>
               <p:cNvPr id="79" name="TextBox 78">
@@ -6136,8 +6136,8 @@
           </a:fontRef>
         </p:style>
       </p:cxnSp>
-      <mc:AlternateContent xmlns:mc="http://schemas.openxmlformats.org/markup-compatibility/2006">
-        <mc:Choice xmlns:a14="http://schemas.microsoft.com/office/drawing/2010/main" Requires="a14">
+      <mc:AlternateContent xmlns:mc="http://schemas.openxmlformats.org/markup-compatibility/2006" xmlns:a14="http://schemas.microsoft.com/office/drawing/2010/main">
+        <mc:Choice Requires="a14">
           <p:sp>
             <p:nvSpPr>
               <p:cNvPr id="6" name="TextBox 5">
@@ -6193,7 +6193,7 @@
             </p:txBody>
           </p:sp>
         </mc:Choice>
-        <mc:Fallback>
+        <mc:Fallback xmlns="">
           <p:sp>
             <p:nvSpPr>
               <p:cNvPr id="6" name="TextBox 5">
@@ -6238,8 +6238,8 @@
           </p:sp>
         </mc:Fallback>
       </mc:AlternateContent>
-      <mc:AlternateContent xmlns:mc="http://schemas.openxmlformats.org/markup-compatibility/2006">
-        <mc:Choice xmlns:a14="http://schemas.microsoft.com/office/drawing/2010/main" Requires="a14">
+      <mc:AlternateContent xmlns:mc="http://schemas.openxmlformats.org/markup-compatibility/2006" xmlns:a14="http://schemas.microsoft.com/office/drawing/2010/main">
+        <mc:Choice Requires="a14">
           <p:sp>
             <p:nvSpPr>
               <p:cNvPr id="7" name="TextBox 6">
@@ -6285,13 +6285,7 @@
                         <a:rPr lang="da-DK" sz="1100" i="1" smtClean="0">
                           <a:latin typeface="Cambria Math" panose="02040503050406030204" pitchFamily="18" charset="0"/>
                         </a:rPr>
-                        <m:t>.</m:t>
-                      </m:r>
-                      <m:r>
-                        <a:rPr lang="da-DK" sz="1100" i="1" smtClean="0">
-                          <a:latin typeface="Cambria Math" panose="02040503050406030204" pitchFamily="18" charset="0"/>
-                        </a:rPr>
-                        <m:t>9</m:t>
+                        <m:t>.9</m:t>
                       </m:r>
                       <m:r>
                         <a:rPr lang="da-DK" sz="1100" b="0" i="0" smtClean="0">
@@ -6307,7 +6301,7 @@
             </p:txBody>
           </p:sp>
         </mc:Choice>
-        <mc:Fallback>
+        <mc:Fallback xmlns="">
           <p:sp>
             <p:nvSpPr>
               <p:cNvPr id="7" name="TextBox 6">
@@ -6410,7 +6404,7 @@
             <p:spPr>
               <a:xfrm>
                 <a:off x="3005991" y="186223"/>
-                <a:ext cx="804451" cy="279307"/>
+                <a:ext cx="770788" cy="305918"/>
               </a:xfrm>
               <a:prstGeom prst="rect">
                 <a:avLst/>
@@ -6463,7 +6457,7 @@
                               <a:latin typeface="Cambria Math" panose="02040503050406030204" pitchFamily="18" charset="0"/>
                               <a:cs typeface="Times New Roman" panose="02020603050405020304" pitchFamily="18" charset="0"/>
                             </a:rPr>
-                            <m:t>𝑹𝒆𝒂𝒍𝒊𝒔𝒕𝒊𝒄</m:t>
+                            <m:t>𝑶𝒑𝒕𝒊𝒎𝒂𝒍</m:t>
                           </m:r>
                           <m:r>
                             <a:rPr lang="da-DK" sz="1100" b="1" i="1">
@@ -6503,7 +6497,7 @@
             <p:spPr>
               <a:xfrm>
                 <a:off x="3005991" y="186223"/>
-                <a:ext cx="804451" cy="279307"/>
+                <a:ext cx="770788" cy="305918"/>
               </a:xfrm>
               <a:prstGeom prst="rect">
                 <a:avLst/>
@@ -6575,8 +6569,8 @@
           </a:fontRef>
         </p:style>
       </p:cxnSp>
-      <mc:AlternateContent xmlns:mc="http://schemas.openxmlformats.org/markup-compatibility/2006">
-        <mc:Choice xmlns:a14="http://schemas.microsoft.com/office/drawing/2010/main" Requires="a14">
+      <mc:AlternateContent xmlns:mc="http://schemas.openxmlformats.org/markup-compatibility/2006" xmlns:a14="http://schemas.microsoft.com/office/drawing/2010/main">
+        <mc:Choice Requires="a14">
           <p:sp>
             <p:nvSpPr>
               <p:cNvPr id="18" name="TextBox 17">
@@ -6675,7 +6669,7 @@
             </p:txBody>
           </p:sp>
         </mc:Choice>
-        <mc:Fallback>
+        <mc:Fallback xmlns="">
           <p:sp>
             <p:nvSpPr>
               <p:cNvPr id="18" name="TextBox 17">

</xml_diff>